<commit_message>
feat: fix book and ppt figure
</commit_message>
<xml_diff>
--- a/Template presentasi TA.pptx
+++ b/Template presentasi TA.pptx
@@ -6,10 +6,10 @@
     <p:sldMasterId id="2147483808" r:id="rId5"/>
   </p:sldMasterIdLst>
   <p:notesMasterIdLst>
-    <p:notesMasterId r:id="rId28"/>
+    <p:notesMasterId r:id="rId29"/>
   </p:notesMasterIdLst>
   <p:handoutMasterIdLst>
-    <p:handoutMasterId r:id="rId29"/>
+    <p:handoutMasterId r:id="rId30"/>
   </p:handoutMasterIdLst>
   <p:sldIdLst>
     <p:sldId id="634" r:id="rId6"/>
@@ -32,8 +32,9 @@
     <p:sldId id="678" r:id="rId23"/>
     <p:sldId id="679" r:id="rId24"/>
     <p:sldId id="680" r:id="rId25"/>
-    <p:sldId id="681" r:id="rId26"/>
-    <p:sldId id="653" r:id="rId27"/>
+    <p:sldId id="682" r:id="rId26"/>
+    <p:sldId id="681" r:id="rId27"/>
+    <p:sldId id="653" r:id="rId28"/>
   </p:sldIdLst>
   <p:sldSz cx="12192000" cy="6858000"/>
   <p:notesSz cx="7315200" cy="9601200"/>
@@ -157,6 +158,7 @@
             <p14:sldId id="678"/>
             <p14:sldId id="679"/>
             <p14:sldId id="680"/>
+            <p14:sldId id="682"/>
             <p14:sldId id="681"/>
             <p14:sldId id="653"/>
           </p14:sldIdLst>
@@ -322,7 +324,7 @@
           <a:p>
             <a:fld id="{2D8DF117-F36D-4197-BD9C-D7ED3849AC71}" type="datetimeFigureOut">
               <a:rPr lang="en-US" smtClean="0"/>
-              <a:t>6/2/2023</a:t>
+              <a:t>6/5/23</a:t>
             </a:fld>
             <a:endParaRPr lang="en-US"/>
           </a:p>
@@ -487,7 +489,7 @@
           <a:p>
             <a:fld id="{F2C69B06-AE52-4203-9155-65C4258A32D1}" type="datetimeFigureOut">
               <a:rPr lang="en-US" smtClean="0"/>
-              <a:t>6/2/2023</a:t>
+              <a:t>6/5/23</a:t>
             </a:fld>
             <a:endParaRPr lang="en-US"/>
           </a:p>
@@ -1262,6 +1264,129 @@
     </p:spTree>
     <p:extLst>
       <p:ext uri="{BB962C8B-B14F-4D97-AF65-F5344CB8AC3E}">
+        <p14:creationId xmlns:p14="http://schemas.microsoft.com/office/powerpoint/2010/main" val="2062396258"/>
+      </p:ext>
+    </p:extLst>
+  </p:cSld>
+  <p:clrMapOvr>
+    <a:masterClrMapping/>
+  </p:clrMapOvr>
+</p:notes>
+</file>
+
+<file path=ppt/notesSlides/notesSlide13.xml><?xml version="1.0" encoding="utf-8"?>
+<p:notes xmlns:a="http://schemas.openxmlformats.org/drawingml/2006/main" xmlns:r="http://schemas.openxmlformats.org/officeDocument/2006/relationships" xmlns:p="http://schemas.openxmlformats.org/presentationml/2006/main">
+  <p:cSld>
+    <p:spTree>
+      <p:nvGrpSpPr>
+        <p:cNvPr id="1" name=""/>
+        <p:cNvGrpSpPr/>
+        <p:nvPr/>
+      </p:nvGrpSpPr>
+      <p:grpSpPr>
+        <a:xfrm>
+          <a:off x="0" y="0"/>
+          <a:ext cx="0" cy="0"/>
+          <a:chOff x="0" y="0"/>
+          <a:chExt cx="0" cy="0"/>
+        </a:xfrm>
+      </p:grpSpPr>
+      <p:sp>
+        <p:nvSpPr>
+          <p:cNvPr id="2" name="Slide Image Placeholder 1"/>
+          <p:cNvSpPr>
+            <a:spLocks noGrp="1" noRot="1" noChangeAspect="1"/>
+          </p:cNvSpPr>
+          <p:nvPr>
+            <p:ph type="sldImg"/>
+          </p:nvPr>
+        </p:nvSpPr>
+        <p:spPr/>
+      </p:sp>
+      <p:sp>
+        <p:nvSpPr>
+          <p:cNvPr id="3" name="Notes Placeholder 2"/>
+          <p:cNvSpPr>
+            <a:spLocks noGrp="1"/>
+          </p:cNvSpPr>
+          <p:nvPr>
+            <p:ph type="body" idx="1"/>
+          </p:nvPr>
+        </p:nvSpPr>
+        <p:spPr/>
+        <p:txBody>
+          <a:bodyPr/>
+          <a:lstStyle/>
+          <a:p>
+            <a:pPr marL="0" marR="0" lvl="0" indent="0" algn="l" defTabSz="914400" rtl="0" eaLnBrk="1" fontAlgn="auto" latinLnBrk="0" hangingPunct="1">
+              <a:lnSpc>
+                <a:spcPct val="100000"/>
+              </a:lnSpc>
+              <a:spcBef>
+                <a:spcPts val="0"/>
+              </a:spcBef>
+              <a:spcAft>
+                <a:spcPts val="0"/>
+              </a:spcAft>
+              <a:buClrTx/>
+              <a:buSzTx/>
+              <a:buFontTx/>
+              <a:buNone/>
+              <a:tabLst/>
+              <a:defRPr/>
+            </a:pPr>
+            <a:r>
+              <a:rPr lang="en-US" dirty="0"/>
+              <a:t>The study addressed the problem of detecting human emotions from audio data by integrating the Transformer Encoder and CNN architectures. The </a:t>
+            </a:r>
+            <a:r>
+              <a:rPr lang="en-US" dirty="0" err="1"/>
+              <a:t>Pararel</a:t>
+            </a:r>
+            <a:r>
+              <a:rPr lang="en-US" dirty="0"/>
+              <a:t> Transformer Encoder with CNN Architecture model demonstrated improved performance in emotion detection by capturing global dependencies and local patterns in audio features. Optimization techniques, including fine-tuning hyperparameters and applying regularization methods, further enhanced accuracy. Comparative analysis with SVM, </a:t>
+            </a:r>
+            <a:r>
+              <a:rPr lang="en-US" dirty="0" err="1"/>
+              <a:t>LeNet</a:t>
+            </a:r>
+            <a:r>
+              <a:rPr lang="en-US" dirty="0"/>
+              <a:t>-based CNN, and CRNN models revealed that the Parallel Transformer Encoder with CNN Architecture achieved the highest accuracy, followed by the SVM model. The study highlights the effectiveness of the proposed model for emotion detection from audio data.</a:t>
+            </a:r>
+          </a:p>
+          <a:p>
+            <a:endParaRPr lang="en-US" dirty="0"/>
+          </a:p>
+        </p:txBody>
+      </p:sp>
+      <p:sp>
+        <p:nvSpPr>
+          <p:cNvPr id="4" name="Slide Number Placeholder 3"/>
+          <p:cNvSpPr>
+            <a:spLocks noGrp="1"/>
+          </p:cNvSpPr>
+          <p:nvPr>
+            <p:ph type="sldNum" sz="quarter" idx="5"/>
+          </p:nvPr>
+        </p:nvSpPr>
+        <p:spPr/>
+        <p:txBody>
+          <a:bodyPr/>
+          <a:lstStyle/>
+          <a:p>
+            <a:fld id="{E10FB84E-2805-4468-A00F-CFA6F38630CE}" type="slidenum">
+              <a:rPr lang="en-US" smtClean="0"/>
+              <a:t>22</a:t>
+            </a:fld>
+            <a:endParaRPr lang="en-US"/>
+          </a:p>
+        </p:txBody>
+      </p:sp>
+    </p:spTree>
+    <p:extLst>
+      <p:ext uri="{BB962C8B-B14F-4D97-AF65-F5344CB8AC3E}">
         <p14:creationId xmlns:p14="http://schemas.microsoft.com/office/powerpoint/2010/main" val="1075680721"/>
       </p:ext>
     </p:extLst>
@@ -2702,7 +2827,7 @@
           <a:p>
             <a:fld id="{82E1281C-38DA-4818-8C55-31099151AAF6}" type="datetimeFigureOut">
               <a:rPr lang="id-ID" smtClean="0"/>
-              <a:t>02/06/2023</a:t>
+              <a:t>05/06/23</a:t>
             </a:fld>
             <a:endParaRPr lang="id-ID"/>
           </a:p>
@@ -2872,7 +2997,7 @@
           <a:p>
             <a:fld id="{82E1281C-38DA-4818-8C55-31099151AAF6}" type="datetimeFigureOut">
               <a:rPr lang="id-ID" smtClean="0"/>
-              <a:t>02/06/2023</a:t>
+              <a:t>05/06/23</a:t>
             </a:fld>
             <a:endParaRPr lang="id-ID"/>
           </a:p>
@@ -3052,7 +3177,7 @@
           <a:p>
             <a:fld id="{82E1281C-38DA-4818-8C55-31099151AAF6}" type="datetimeFigureOut">
               <a:rPr lang="id-ID" smtClean="0"/>
-              <a:t>02/06/2023</a:t>
+              <a:t>05/06/23</a:t>
             </a:fld>
             <a:endParaRPr lang="id-ID"/>
           </a:p>
@@ -4123,7 +4248,7 @@
                 </a:solidFill>
               </a:rPr>
               <a:pPr/>
-              <a:t>6/2/2023</a:t>
+              <a:t>6/5/23</a:t>
             </a:fld>
             <a:endParaRPr lang="en-US">
               <a:solidFill>
@@ -4353,7 +4478,7 @@
                 </a:solidFill>
               </a:rPr>
               <a:pPr/>
-              <a:t>6/2/2023</a:t>
+              <a:t>6/5/23</a:t>
             </a:fld>
             <a:endParaRPr lang="en-US">
               <a:solidFill>
@@ -4660,7 +4785,7 @@
                 </a:solidFill>
               </a:rPr>
               <a:pPr/>
-              <a:t>6/2/2023</a:t>
+              <a:t>6/5/23</a:t>
             </a:fld>
             <a:endParaRPr lang="en-US">
               <a:solidFill>
@@ -4957,7 +5082,7 @@
                 </a:solidFill>
               </a:rPr>
               <a:pPr/>
-              <a:t>6/2/2023</a:t>
+              <a:t>6/5/23</a:t>
             </a:fld>
             <a:endParaRPr lang="en-US">
               <a:solidFill>
@@ -5401,7 +5526,7 @@
                 </a:solidFill>
               </a:rPr>
               <a:pPr/>
-              <a:t>6/2/2023</a:t>
+              <a:t>6/5/23</a:t>
             </a:fld>
             <a:endParaRPr lang="en-US">
               <a:solidFill>
@@ -5574,7 +5699,7 @@
                 </a:solidFill>
               </a:rPr>
               <a:pPr/>
-              <a:t>6/2/2023</a:t>
+              <a:t>6/5/23</a:t>
             </a:fld>
             <a:endParaRPr lang="en-US">
               <a:solidFill>
@@ -5719,7 +5844,7 @@
                 </a:solidFill>
               </a:rPr>
               <a:pPr/>
-              <a:t>6/2/2023</a:t>
+              <a:t>6/5/23</a:t>
             </a:fld>
             <a:endParaRPr lang="en-US">
               <a:solidFill>
@@ -6016,7 +6141,7 @@
           <a:p>
             <a:fld id="{82E1281C-38DA-4818-8C55-31099151AAF6}" type="datetimeFigureOut">
               <a:rPr lang="id-ID" smtClean="0"/>
-              <a:t>02/06/2023</a:t>
+              <a:t>05/06/23</a:t>
             </a:fld>
             <a:endParaRPr lang="id-ID"/>
           </a:p>
@@ -6322,7 +6447,7 @@
                 </a:solidFill>
               </a:rPr>
               <a:pPr/>
-              <a:t>6/2/2023</a:t>
+              <a:t>6/5/23</a:t>
             </a:fld>
             <a:endParaRPr lang="en-US">
               <a:solidFill>
@@ -6642,7 +6767,7 @@
                 </a:solidFill>
               </a:rPr>
               <a:pPr/>
-              <a:t>6/2/2023</a:t>
+              <a:t>6/5/23</a:t>
             </a:fld>
             <a:endParaRPr lang="en-US">
               <a:solidFill>
@@ -6872,7 +6997,7 @@
                 </a:solidFill>
               </a:rPr>
               <a:pPr/>
-              <a:t>6/2/2023</a:t>
+              <a:t>6/5/23</a:t>
             </a:fld>
             <a:endParaRPr lang="en-US">
               <a:solidFill>
@@ -7112,7 +7237,7 @@
                 </a:solidFill>
               </a:rPr>
               <a:pPr/>
-              <a:t>6/2/2023</a:t>
+              <a:t>6/5/23</a:t>
             </a:fld>
             <a:endParaRPr lang="en-US">
               <a:solidFill>
@@ -7285,7 +7410,7 @@
                 </a:solidFill>
               </a:rPr>
               <a:pPr/>
-              <a:t>6/2/2023</a:t>
+              <a:t>6/5/23</a:t>
             </a:fld>
             <a:endParaRPr lang="en-US">
               <a:solidFill>
@@ -7568,7 +7693,7 @@
           <a:p>
             <a:fld id="{82E1281C-38DA-4818-8C55-31099151AAF6}" type="datetimeFigureOut">
               <a:rPr lang="id-ID" smtClean="0"/>
-              <a:t>02/06/2023</a:t>
+              <a:t>05/06/23</a:t>
             </a:fld>
             <a:endParaRPr lang="id-ID"/>
           </a:p>
@@ -7800,7 +7925,7 @@
           <a:p>
             <a:fld id="{82E1281C-38DA-4818-8C55-31099151AAF6}" type="datetimeFigureOut">
               <a:rPr lang="id-ID" smtClean="0"/>
-              <a:t>02/06/2023</a:t>
+              <a:t>05/06/23</a:t>
             </a:fld>
             <a:endParaRPr lang="id-ID"/>
           </a:p>
@@ -8167,7 +8292,7 @@
           <a:p>
             <a:fld id="{82E1281C-38DA-4818-8C55-31099151AAF6}" type="datetimeFigureOut">
               <a:rPr lang="id-ID" smtClean="0"/>
-              <a:t>02/06/2023</a:t>
+              <a:t>05/06/23</a:t>
             </a:fld>
             <a:endParaRPr lang="id-ID"/>
           </a:p>
@@ -8285,7 +8410,7 @@
           <a:p>
             <a:fld id="{82E1281C-38DA-4818-8C55-31099151AAF6}" type="datetimeFigureOut">
               <a:rPr lang="id-ID" smtClean="0"/>
-              <a:t>02/06/2023</a:t>
+              <a:t>05/06/23</a:t>
             </a:fld>
             <a:endParaRPr lang="id-ID"/>
           </a:p>
@@ -8380,7 +8505,7 @@
           <a:p>
             <a:fld id="{82E1281C-38DA-4818-8C55-31099151AAF6}" type="datetimeFigureOut">
               <a:rPr lang="id-ID" smtClean="0"/>
-              <a:t>02/06/2023</a:t>
+              <a:t>05/06/23</a:t>
             </a:fld>
             <a:endParaRPr lang="id-ID"/>
           </a:p>
@@ -8657,7 +8782,7 @@
           <a:p>
             <a:fld id="{82E1281C-38DA-4818-8C55-31099151AAF6}" type="datetimeFigureOut">
               <a:rPr lang="id-ID" smtClean="0"/>
-              <a:t>02/06/2023</a:t>
+              <a:t>05/06/23</a:t>
             </a:fld>
             <a:endParaRPr lang="id-ID"/>
           </a:p>
@@ -8910,7 +9035,7 @@
           <a:p>
             <a:fld id="{82E1281C-38DA-4818-8C55-31099151AAF6}" type="datetimeFigureOut">
               <a:rPr lang="id-ID" smtClean="0"/>
-              <a:t>02/06/2023</a:t>
+              <a:t>05/06/23</a:t>
             </a:fld>
             <a:endParaRPr lang="id-ID"/>
           </a:p>
@@ -9132,7 +9257,7 @@
           <a:p>
             <a:fld id="{82E1281C-38DA-4818-8C55-31099151AAF6}" type="datetimeFigureOut">
               <a:rPr lang="id-ID" smtClean="0"/>
-              <a:t>02/06/2023</a:t>
+              <a:t>05/06/23</a:t>
             </a:fld>
             <a:endParaRPr lang="id-ID"/>
           </a:p>
@@ -9705,7 +9830,7 @@
                 </a:solidFill>
               </a:rPr>
               <a:pPr/>
-              <a:t>6/2/2023</a:t>
+              <a:t>6/5/23</a:t>
             </a:fld>
             <a:endParaRPr lang="en-US">
               <a:solidFill>
@@ -15349,6 +15474,334 @@
           <a:p>
             <a:pPr algn="ctr"/>
             <a:r>
+              <a:rPr lang="en-US" dirty="0" err="1"/>
+              <a:t>Kesulitan</a:t>
+            </a:r>
+            <a:endParaRPr lang="en-US" dirty="0"/>
+          </a:p>
+        </p:txBody>
+      </p:sp>
+      <p:sp>
+        <p:nvSpPr>
+          <p:cNvPr id="9" name="Google Shape;277;p9">
+            <a:extLst>
+              <a:ext uri="{FF2B5EF4-FFF2-40B4-BE49-F238E27FC236}">
+                <a16:creationId xmlns:a16="http://schemas.microsoft.com/office/drawing/2014/main" id="{21F87AE8-D962-2CB0-1D30-AEB67B2E726B}"/>
+              </a:ext>
+            </a:extLst>
+          </p:cNvPr>
+          <p:cNvSpPr txBox="1">
+            <a:spLocks/>
+          </p:cNvSpPr>
+          <p:nvPr/>
+        </p:nvSpPr>
+        <p:spPr>
+          <a:xfrm>
+            <a:off x="2988600" y="2438868"/>
+            <a:ext cx="6214800" cy="2536963"/>
+          </a:xfrm>
+          <a:prstGeom prst="rect">
+            <a:avLst/>
+          </a:prstGeom>
+          <a:noFill/>
+          <a:ln>
+            <a:noFill/>
+          </a:ln>
+        </p:spPr>
+        <p:txBody>
+          <a:bodyPr spcFirstLastPara="1" vert="horz" wrap="square" lIns="121900" tIns="121900" rIns="121900" bIns="121900" rtlCol="0" anchor="ctr" anchorCtr="0">
+            <a:noAutofit/>
+          </a:bodyPr>
+          <a:lstStyle>
+            <a:lvl1pPr marL="228600" indent="-228600" algn="l" defTabSz="914400" rtl="0" eaLnBrk="1" latinLnBrk="0" hangingPunct="1">
+              <a:lnSpc>
+                <a:spcPct val="90000"/>
+              </a:lnSpc>
+              <a:spcBef>
+                <a:spcPts val="1000"/>
+              </a:spcBef>
+              <a:buFont typeface="Arial" panose="020B0604020202020204" pitchFamily="34" charset="0"/>
+              <a:buChar char="•"/>
+              <a:defRPr sz="2800" kern="1200">
+                <a:solidFill>
+                  <a:schemeClr val="tx1"/>
+                </a:solidFill>
+                <a:latin typeface="+mn-lt"/>
+                <a:ea typeface="+mn-ea"/>
+                <a:cs typeface="+mn-cs"/>
+              </a:defRPr>
+            </a:lvl1pPr>
+            <a:lvl2pPr marL="685800" indent="-228600" algn="l" defTabSz="914400" rtl="0" eaLnBrk="1" latinLnBrk="0" hangingPunct="1">
+              <a:lnSpc>
+                <a:spcPct val="90000"/>
+              </a:lnSpc>
+              <a:spcBef>
+                <a:spcPts val="500"/>
+              </a:spcBef>
+              <a:buFont typeface="Arial" panose="020B0604020202020204" pitchFamily="34" charset="0"/>
+              <a:buChar char="•"/>
+              <a:defRPr sz="2400" kern="1200">
+                <a:solidFill>
+                  <a:schemeClr val="tx1"/>
+                </a:solidFill>
+                <a:latin typeface="+mn-lt"/>
+                <a:ea typeface="+mn-ea"/>
+                <a:cs typeface="+mn-cs"/>
+              </a:defRPr>
+            </a:lvl2pPr>
+            <a:lvl3pPr marL="1143000" indent="-228600" algn="l" defTabSz="914400" rtl="0" eaLnBrk="1" latinLnBrk="0" hangingPunct="1">
+              <a:lnSpc>
+                <a:spcPct val="90000"/>
+              </a:lnSpc>
+              <a:spcBef>
+                <a:spcPts val="500"/>
+              </a:spcBef>
+              <a:buFont typeface="Arial" panose="020B0604020202020204" pitchFamily="34" charset="0"/>
+              <a:buChar char="•"/>
+              <a:defRPr sz="2000" kern="1200">
+                <a:solidFill>
+                  <a:schemeClr val="tx1"/>
+                </a:solidFill>
+                <a:latin typeface="+mn-lt"/>
+                <a:ea typeface="+mn-ea"/>
+                <a:cs typeface="+mn-cs"/>
+              </a:defRPr>
+            </a:lvl3pPr>
+            <a:lvl4pPr marL="1600200" indent="-228600" algn="l" defTabSz="914400" rtl="0" eaLnBrk="1" latinLnBrk="0" hangingPunct="1">
+              <a:lnSpc>
+                <a:spcPct val="90000"/>
+              </a:lnSpc>
+              <a:spcBef>
+                <a:spcPts val="500"/>
+              </a:spcBef>
+              <a:buFont typeface="Arial" panose="020B0604020202020204" pitchFamily="34" charset="0"/>
+              <a:buChar char="•"/>
+              <a:defRPr sz="1800" kern="1200">
+                <a:solidFill>
+                  <a:schemeClr val="tx1"/>
+                </a:solidFill>
+                <a:latin typeface="+mn-lt"/>
+                <a:ea typeface="+mn-ea"/>
+                <a:cs typeface="+mn-cs"/>
+              </a:defRPr>
+            </a:lvl4pPr>
+            <a:lvl5pPr marL="2057400" indent="-228600" algn="l" defTabSz="914400" rtl="0" eaLnBrk="1" latinLnBrk="0" hangingPunct="1">
+              <a:lnSpc>
+                <a:spcPct val="90000"/>
+              </a:lnSpc>
+              <a:spcBef>
+                <a:spcPts val="500"/>
+              </a:spcBef>
+              <a:buFont typeface="Arial" panose="020B0604020202020204" pitchFamily="34" charset="0"/>
+              <a:buChar char="•"/>
+              <a:defRPr sz="1800" kern="1200">
+                <a:solidFill>
+                  <a:schemeClr val="tx1"/>
+                </a:solidFill>
+                <a:latin typeface="+mn-lt"/>
+                <a:ea typeface="+mn-ea"/>
+                <a:cs typeface="+mn-cs"/>
+              </a:defRPr>
+            </a:lvl5pPr>
+            <a:lvl6pPr marL="2514600" indent="-228600" algn="l" defTabSz="914400" rtl="0" eaLnBrk="1" latinLnBrk="0" hangingPunct="1">
+              <a:lnSpc>
+                <a:spcPct val="90000"/>
+              </a:lnSpc>
+              <a:spcBef>
+                <a:spcPts val="500"/>
+              </a:spcBef>
+              <a:buFont typeface="Arial" panose="020B0604020202020204" pitchFamily="34" charset="0"/>
+              <a:buChar char="•"/>
+              <a:defRPr sz="1800" kern="1200">
+                <a:solidFill>
+                  <a:schemeClr val="tx1"/>
+                </a:solidFill>
+                <a:latin typeface="+mn-lt"/>
+                <a:ea typeface="+mn-ea"/>
+                <a:cs typeface="+mn-cs"/>
+              </a:defRPr>
+            </a:lvl6pPr>
+            <a:lvl7pPr marL="2971800" indent="-228600" algn="l" defTabSz="914400" rtl="0" eaLnBrk="1" latinLnBrk="0" hangingPunct="1">
+              <a:lnSpc>
+                <a:spcPct val="90000"/>
+              </a:lnSpc>
+              <a:spcBef>
+                <a:spcPts val="500"/>
+              </a:spcBef>
+              <a:buFont typeface="Arial" panose="020B0604020202020204" pitchFamily="34" charset="0"/>
+              <a:buChar char="•"/>
+              <a:defRPr sz="1800" kern="1200">
+                <a:solidFill>
+                  <a:schemeClr val="tx1"/>
+                </a:solidFill>
+                <a:latin typeface="+mn-lt"/>
+                <a:ea typeface="+mn-ea"/>
+                <a:cs typeface="+mn-cs"/>
+              </a:defRPr>
+            </a:lvl7pPr>
+            <a:lvl8pPr marL="3429000" indent="-228600" algn="l" defTabSz="914400" rtl="0" eaLnBrk="1" latinLnBrk="0" hangingPunct="1">
+              <a:lnSpc>
+                <a:spcPct val="90000"/>
+              </a:lnSpc>
+              <a:spcBef>
+                <a:spcPts val="500"/>
+              </a:spcBef>
+              <a:buFont typeface="Arial" panose="020B0604020202020204" pitchFamily="34" charset="0"/>
+              <a:buChar char="•"/>
+              <a:defRPr sz="1800" kern="1200">
+                <a:solidFill>
+                  <a:schemeClr val="tx1"/>
+                </a:solidFill>
+                <a:latin typeface="+mn-lt"/>
+                <a:ea typeface="+mn-ea"/>
+                <a:cs typeface="+mn-cs"/>
+              </a:defRPr>
+            </a:lvl8pPr>
+            <a:lvl9pPr marL="3886200" indent="-228600" algn="l" defTabSz="914400" rtl="0" eaLnBrk="1" latinLnBrk="0" hangingPunct="1">
+              <a:lnSpc>
+                <a:spcPct val="90000"/>
+              </a:lnSpc>
+              <a:spcBef>
+                <a:spcPts val="500"/>
+              </a:spcBef>
+              <a:buFont typeface="Arial" panose="020B0604020202020204" pitchFamily="34" charset="0"/>
+              <a:buChar char="•"/>
+              <a:defRPr sz="1800" kern="1200">
+                <a:solidFill>
+                  <a:schemeClr val="tx1"/>
+                </a:solidFill>
+                <a:latin typeface="+mn-lt"/>
+                <a:ea typeface="+mn-ea"/>
+                <a:cs typeface="+mn-cs"/>
+              </a:defRPr>
+            </a:lvl9pPr>
+          </a:lstStyle>
+          <a:p>
+            <a:pPr marL="0" indent="0" algn="just">
+              <a:buNone/>
+            </a:pPr>
+            <a:r>
+              <a:rPr lang="en-US" sz="1800" dirty="0"/>
+              <a:t>The study addressed the problem of detecting human emotions from audio data by integrating the Transformer Encoder and CNN architectures to capture global dependencies and local patterns in audio features. Optimization techniques include fine-tuning hyperparameters and applying regularization methods, further enhanced accuracy. Comparative analysis on different models revealed that the Parallel Transformer Encoder with CNN Architecture achieved the highest accuracy, followed by the SVM model.</a:t>
+            </a:r>
+          </a:p>
+        </p:txBody>
+      </p:sp>
+      <p:cxnSp>
+        <p:nvCxnSpPr>
+          <p:cNvPr id="10" name="Google Shape;281;p9">
+            <a:extLst>
+              <a:ext uri="{FF2B5EF4-FFF2-40B4-BE49-F238E27FC236}">
+                <a16:creationId xmlns:a16="http://schemas.microsoft.com/office/drawing/2014/main" id="{8C501EF5-40A1-5ACA-3AA6-689FF195012D}"/>
+              </a:ext>
+            </a:extLst>
+          </p:cNvPr>
+          <p:cNvCxnSpPr/>
+          <p:nvPr/>
+        </p:nvCxnSpPr>
+        <p:spPr>
+          <a:xfrm>
+            <a:off x="3388800" y="2428845"/>
+            <a:ext cx="5414400" cy="0"/>
+          </a:xfrm>
+          <a:prstGeom prst="straightConnector1">
+            <a:avLst/>
+          </a:prstGeom>
+          <a:noFill/>
+          <a:ln w="9525" cap="flat" cmpd="sng">
+            <a:solidFill>
+              <a:srgbClr val="FF0000"/>
+            </a:solidFill>
+            <a:prstDash val="solid"/>
+            <a:round/>
+            <a:headEnd type="none" w="sm" len="sm"/>
+            <a:tailEnd type="none" w="sm" len="sm"/>
+          </a:ln>
+        </p:spPr>
+      </p:cxnSp>
+    </p:spTree>
+    <p:extLst>
+      <p:ext uri="{BB962C8B-B14F-4D97-AF65-F5344CB8AC3E}">
+        <p14:creationId xmlns:p14="http://schemas.microsoft.com/office/powerpoint/2010/main" val="2761440831"/>
+      </p:ext>
+    </p:extLst>
+  </p:cSld>
+  <p:clrMapOvr>
+    <a:masterClrMapping/>
+  </p:clrMapOvr>
+</p:sld>
+</file>
+
+<file path=ppt/slides/slide22.xml><?xml version="1.0" encoding="utf-8"?>
+<p:sld xmlns:a="http://schemas.openxmlformats.org/drawingml/2006/main" xmlns:r="http://schemas.openxmlformats.org/officeDocument/2006/relationships" xmlns:p="http://schemas.openxmlformats.org/presentationml/2006/main">
+  <p:cSld>
+    <p:spTree>
+      <p:nvGrpSpPr>
+        <p:cNvPr id="1" name=""/>
+        <p:cNvGrpSpPr/>
+        <p:nvPr/>
+      </p:nvGrpSpPr>
+      <p:grpSpPr>
+        <a:xfrm>
+          <a:off x="0" y="0"/>
+          <a:ext cx="0" cy="0"/>
+          <a:chOff x="0" y="0"/>
+          <a:chExt cx="0" cy="0"/>
+        </a:xfrm>
+      </p:grpSpPr>
+      <p:sp>
+        <p:nvSpPr>
+          <p:cNvPr id="8" name="Google Shape;276;p9">
+            <a:extLst>
+              <a:ext uri="{FF2B5EF4-FFF2-40B4-BE49-F238E27FC236}">
+                <a16:creationId xmlns:a16="http://schemas.microsoft.com/office/drawing/2014/main" id="{C0948A61-B9B7-C3C5-E8C7-6C57F58FAAC7}"/>
+              </a:ext>
+            </a:extLst>
+          </p:cNvPr>
+          <p:cNvSpPr txBox="1">
+            <a:spLocks/>
+          </p:cNvSpPr>
+          <p:nvPr/>
+        </p:nvSpPr>
+        <p:spPr>
+          <a:xfrm>
+            <a:off x="2988600" y="1545475"/>
+            <a:ext cx="6214800" cy="893200"/>
+          </a:xfrm>
+          <a:prstGeom prst="rect">
+            <a:avLst/>
+          </a:prstGeom>
+          <a:noFill/>
+          <a:ln>
+            <a:noFill/>
+          </a:ln>
+        </p:spPr>
+        <p:txBody>
+          <a:bodyPr spcFirstLastPara="1" vert="horz" wrap="square" lIns="121900" tIns="121900" rIns="121900" bIns="121900" rtlCol="0" anchor="ctr" anchorCtr="0">
+            <a:noAutofit/>
+          </a:bodyPr>
+          <a:lstStyle>
+            <a:lvl1pPr algn="l" defTabSz="914400" rtl="0" eaLnBrk="1" latinLnBrk="0" hangingPunct="1">
+              <a:lnSpc>
+                <a:spcPct val="90000"/>
+              </a:lnSpc>
+              <a:spcBef>
+                <a:spcPct val="0"/>
+              </a:spcBef>
+              <a:buNone/>
+              <a:defRPr sz="4400" kern="1200">
+                <a:solidFill>
+                  <a:schemeClr val="tx1"/>
+                </a:solidFill>
+                <a:latin typeface="+mj-lt"/>
+                <a:ea typeface="+mj-ea"/>
+                <a:cs typeface="+mj-cs"/>
+              </a:defRPr>
+            </a:lvl1pPr>
+          </a:lstStyle>
+          <a:p>
+            <a:pPr algn="ctr"/>
+            <a:r>
               <a:rPr lang="en-US" dirty="0"/>
               <a:t>Conclusion</a:t>
             </a:r>
@@ -15606,7 +16059,7 @@
 </p:sld>
 </file>
 
-<file path=ppt/slides/slide22.xml><?xml version="1.0" encoding="utf-8"?>
+<file path=ppt/slides/slide23.xml><?xml version="1.0" encoding="utf-8"?>
 <p:sld xmlns:a="http://schemas.openxmlformats.org/drawingml/2006/main" xmlns:r="http://schemas.openxmlformats.org/officeDocument/2006/relationships" xmlns:p="http://schemas.openxmlformats.org/presentationml/2006/main">
   <p:cSld>
     <p:spTree>
@@ -16038,10 +16491,10 @@
       </p:sp>
       <p:pic>
         <p:nvPicPr>
-          <p:cNvPr id="1028" name="Picture 4" descr="Cnn Model : Flow of the basic Faster R-CNN detection model. | Download ...">
+          <p:cNvPr id="1030" name="Picture 6" descr="Support Vector Regression using Python - Dibyendu Deb">
             <a:extLst>
               <a:ext uri="{FF2B5EF4-FFF2-40B4-BE49-F238E27FC236}">
-                <a16:creationId xmlns:a16="http://schemas.microsoft.com/office/drawing/2014/main" id="{5CD42E40-E640-FC8F-F5E3-74626D62D01D}"/>
+                <a16:creationId xmlns:a16="http://schemas.microsoft.com/office/drawing/2014/main" id="{BFB846DF-666C-609A-35CC-DADF58BF6B77}"/>
               </a:ext>
             </a:extLst>
           </p:cNvPr>
@@ -16065,8 +16518,8 @@
         </p:blipFill>
         <p:spPr bwMode="auto">
           <a:xfrm>
-            <a:off x="3935712" y="3167362"/>
-            <a:ext cx="3041796" cy="2281347"/>
+            <a:off x="785292" y="3386014"/>
+            <a:ext cx="2730905" cy="1844045"/>
           </a:xfrm>
           <a:prstGeom prst="rect">
             <a:avLst/>
@@ -16085,10 +16538,10 @@
       </p:pic>
       <p:pic>
         <p:nvPicPr>
-          <p:cNvPr id="1030" name="Picture 6" descr="Support Vector Regression using Python - Dibyendu Deb">
+          <p:cNvPr id="1032" name="Picture 8" descr="Bert系列：BERT（Bidirectional Encoder Representations from Transformers）原理 ...">
             <a:extLst>
               <a:ext uri="{FF2B5EF4-FFF2-40B4-BE49-F238E27FC236}">
-                <a16:creationId xmlns:a16="http://schemas.microsoft.com/office/drawing/2014/main" id="{BFB846DF-666C-609A-35CC-DADF58BF6B77}"/>
+                <a16:creationId xmlns:a16="http://schemas.microsoft.com/office/drawing/2014/main" id="{46C792D8-2AF4-5BB5-4684-E75F132F7EB8}"/>
               </a:ext>
             </a:extLst>
           </p:cNvPr>
@@ -16112,53 +16565,6 @@
         </p:blipFill>
         <p:spPr bwMode="auto">
           <a:xfrm>
-            <a:off x="785292" y="3386014"/>
-            <a:ext cx="2730905" cy="1844045"/>
-          </a:xfrm>
-          <a:prstGeom prst="rect">
-            <a:avLst/>
-          </a:prstGeom>
-          <a:noFill/>
-          <a:extLst>
-            <a:ext uri="{909E8E84-426E-40DD-AFC4-6F175D3DCCD1}">
-              <a14:hiddenFill xmlns:a14="http://schemas.microsoft.com/office/drawing/2010/main">
-                <a:solidFill>
-                  <a:srgbClr val="FFFFFF"/>
-                </a:solidFill>
-              </a14:hiddenFill>
-            </a:ext>
-          </a:extLst>
-        </p:spPr>
-      </p:pic>
-      <p:pic>
-        <p:nvPicPr>
-          <p:cNvPr id="1032" name="Picture 8" descr="Bert系列：BERT（Bidirectional Encoder Representations from Transformers）原理 ...">
-            <a:extLst>
-              <a:ext uri="{FF2B5EF4-FFF2-40B4-BE49-F238E27FC236}">
-                <a16:creationId xmlns:a16="http://schemas.microsoft.com/office/drawing/2014/main" id="{46C792D8-2AF4-5BB5-4684-E75F132F7EB8}"/>
-              </a:ext>
-            </a:extLst>
-          </p:cNvPr>
-          <p:cNvPicPr>
-            <a:picLocks noChangeAspect="1" noChangeArrowheads="1"/>
-          </p:cNvPicPr>
-          <p:nvPr/>
-        </p:nvPicPr>
-        <p:blipFill>
-          <a:blip r:embed="rId5" cstate="print">
-            <a:extLst>
-              <a:ext uri="{28A0092B-C50C-407E-A947-70E740481C1C}">
-                <a14:useLocalDpi xmlns:a14="http://schemas.microsoft.com/office/drawing/2010/main" val="0"/>
-              </a:ext>
-            </a:extLst>
-          </a:blip>
-          <a:srcRect/>
-          <a:stretch>
-            <a:fillRect/>
-          </a:stretch>
-        </p:blipFill>
-        <p:spPr bwMode="auto">
-          <a:xfrm>
             <a:off x="7626204" y="2798916"/>
             <a:ext cx="4228688" cy="2927084"/>
           </a:xfrm>
@@ -16226,8 +16632,8 @@
         </p:nvSpPr>
         <p:spPr>
           <a:xfrm>
-            <a:off x="8986848" y="2389220"/>
-            <a:ext cx="1507400" cy="369332"/>
+            <a:off x="8976384" y="2299127"/>
+            <a:ext cx="1990097" cy="369332"/>
           </a:xfrm>
           <a:prstGeom prst="rect">
             <a:avLst/>
@@ -16242,7 +16648,7 @@
           <a:p>
             <a:r>
               <a:rPr lang="en-US" b="1" dirty="0"/>
-              <a:t>GPT-3 &amp; BERT</a:t>
+              <a:t>Transformer-Based</a:t>
             </a:r>
           </a:p>
         </p:txBody>
@@ -16344,6 +16750,80 @@
                 <a:schemeClr val="tx1"/>
               </a:solidFill>
             </a:endParaRPr>
+          </a:p>
+        </p:txBody>
+      </p:sp>
+      <p:pic>
+        <p:nvPicPr>
+          <p:cNvPr id="7" name="Picture 6" descr="A picture containing diagram, text, plan, line&#10;&#10;Description automatically generated">
+            <a:extLst>
+              <a:ext uri="{FF2B5EF4-FFF2-40B4-BE49-F238E27FC236}">
+                <a16:creationId xmlns:a16="http://schemas.microsoft.com/office/drawing/2014/main" id="{5F38D0FD-1C90-3FEA-5E2C-5A8C9375D864}"/>
+              </a:ext>
+            </a:extLst>
+          </p:cNvPr>
+          <p:cNvPicPr>
+            <a:picLocks noChangeAspect="1"/>
+          </p:cNvPicPr>
+          <p:nvPr/>
+        </p:nvPicPr>
+        <p:blipFill>
+          <a:blip r:embed="rId5">
+            <a:extLst>
+              <a:ext uri="{28A0092B-C50C-407E-A947-70E740481C1C}">
+                <a14:useLocalDpi xmlns:a14="http://schemas.microsoft.com/office/drawing/2010/main" val="0"/>
+              </a:ext>
+            </a:extLst>
+          </a:blip>
+          <a:stretch>
+            <a:fillRect/>
+          </a:stretch>
+        </p:blipFill>
+        <p:spPr>
+          <a:xfrm>
+            <a:off x="3935712" y="3158964"/>
+            <a:ext cx="3043200" cy="2282400"/>
+          </a:xfrm>
+          <a:prstGeom prst="rect">
+            <a:avLst/>
+          </a:prstGeom>
+          <a:ln>
+            <a:noFill/>
+          </a:ln>
+        </p:spPr>
+      </p:pic>
+      <p:sp>
+        <p:nvSpPr>
+          <p:cNvPr id="8" name="TextBox 7">
+            <a:extLst>
+              <a:ext uri="{FF2B5EF4-FFF2-40B4-BE49-F238E27FC236}">
+                <a16:creationId xmlns:a16="http://schemas.microsoft.com/office/drawing/2014/main" id="{2F800376-0E76-A08E-4753-FE6A9223C6F9}"/>
+              </a:ext>
+            </a:extLst>
+          </p:cNvPr>
+          <p:cNvSpPr txBox="1"/>
+          <p:nvPr/>
+        </p:nvSpPr>
+        <p:spPr>
+          <a:xfrm>
+            <a:off x="4986400" y="3167362"/>
+            <a:ext cx="1255472" cy="369332"/>
+          </a:xfrm>
+          <a:prstGeom prst="rect">
+            <a:avLst/>
+          </a:prstGeom>
+          <a:noFill/>
+        </p:spPr>
+        <p:txBody>
+          <a:bodyPr wrap="none" rtlCol="0">
+            <a:spAutoFit/>
+          </a:bodyPr>
+          <a:lstStyle/>
+          <a:p>
+            <a:r>
+              <a:rPr lang="en-US" b="1" dirty="0"/>
+              <a:t>CNN-Based</a:t>
+            </a:r>
           </a:p>
         </p:txBody>
       </p:sp>
@@ -16539,23 +17019,25 @@
       </p:sp>
       <p:pic>
         <p:nvPicPr>
-          <p:cNvPr id="4" name="Google Shape;270;p8">
+          <p:cNvPr id="5" name="Picture 4" descr="A picture containing text, screenshot, diagram, line&#10;&#10;Description automatically generated">
             <a:extLst>
               <a:ext uri="{FF2B5EF4-FFF2-40B4-BE49-F238E27FC236}">
-                <a16:creationId xmlns:a16="http://schemas.microsoft.com/office/drawing/2014/main" id="{91FF9831-E0D0-AA66-DD43-B6D74EB969D6}"/>
+                <a16:creationId xmlns:a16="http://schemas.microsoft.com/office/drawing/2014/main" id="{BD311A59-6E4B-AB35-A55E-349D68D61A5B}"/>
               </a:ext>
             </a:extLst>
           </p:cNvPr>
-          <p:cNvPicPr preferRelativeResize="0">
-            <a:picLocks noGrp="1"/>
+          <p:cNvPicPr>
+            <a:picLocks noChangeAspect="1"/>
           </p:cNvPicPr>
-          <p:nvPr>
-            <p:ph idx="1"/>
-          </p:nvPr>
+          <p:nvPr/>
         </p:nvPicPr>
         <p:blipFill>
           <a:blip r:embed="rId2">
-            <a:alphaModFix/>
+            <a:extLst>
+              <a:ext uri="{28A0092B-C50C-407E-A947-70E740481C1C}">
+                <a14:useLocalDpi xmlns:a14="http://schemas.microsoft.com/office/drawing/2010/main" val="0"/>
+              </a:ext>
+            </a:extLst>
           </a:blip>
           <a:stretch>
             <a:fillRect/>
@@ -16563,18 +17045,52 @@
         </p:blipFill>
         <p:spPr>
           <a:xfrm>
-            <a:off x="1604786" y="2134415"/>
-            <a:ext cx="8982427" cy="2589170"/>
+            <a:off x="1478465" y="2134800"/>
+            <a:ext cx="9235069" cy="2588400"/>
+          </a:xfrm>
+          <a:prstGeom prst="rect">
+            <a:avLst/>
+          </a:prstGeom>
+        </p:spPr>
+      </p:pic>
+      <p:sp>
+        <p:nvSpPr>
+          <p:cNvPr id="8" name="TextBox 7">
+            <a:extLst>
+              <a:ext uri="{FF2B5EF4-FFF2-40B4-BE49-F238E27FC236}">
+                <a16:creationId xmlns:a16="http://schemas.microsoft.com/office/drawing/2014/main" id="{255B2878-9A43-7CBC-22B0-F9042A82D76F}"/>
+              </a:ext>
+            </a:extLst>
+          </p:cNvPr>
+          <p:cNvSpPr txBox="1"/>
+          <p:nvPr/>
+        </p:nvSpPr>
+        <p:spPr>
+          <a:xfrm>
+            <a:off x="10056528" y="3519012"/>
+            <a:ext cx="716863" cy="246221"/>
           </a:xfrm>
           <a:prstGeom prst="rect">
             <a:avLst/>
           </a:prstGeom>
           <a:noFill/>
-          <a:ln>
-            <a:noFill/>
-          </a:ln>
         </p:spPr>
-      </p:pic>
+        <p:txBody>
+          <a:bodyPr wrap="square" rtlCol="0">
+            <a:spAutoFit/>
+          </a:bodyPr>
+          <a:lstStyle/>
+          <a:p>
+            <a:pPr algn="ctr"/>
+            <a:r>
+              <a:rPr lang="en-US" sz="1000" dirty="0">
+                <a:cs typeface="Times New Roman" panose="02020603050405020304" pitchFamily="18" charset="0"/>
+              </a:rPr>
+              <a:t>Emotion</a:t>
+            </a:r>
+          </a:p>
+        </p:txBody>
+      </p:sp>
     </p:spTree>
     <p:extLst>
       <p:ext uri="{BB962C8B-B14F-4D97-AF65-F5344CB8AC3E}">

</xml_diff>

<commit_message>
feat: add latex template
</commit_message>
<xml_diff>
--- a/Template presentasi TA.pptx
+++ b/Template presentasi TA.pptx
@@ -324,7 +324,7 @@
           <a:p>
             <a:fld id="{2D8DF117-F36D-4197-BD9C-D7ED3849AC71}" type="datetimeFigureOut">
               <a:rPr lang="en-US" smtClean="0"/>
-              <a:t>6/5/23</a:t>
+              <a:t>6/7/23</a:t>
             </a:fld>
             <a:endParaRPr lang="en-US"/>
           </a:p>
@@ -489,7 +489,7 @@
           <a:p>
             <a:fld id="{F2C69B06-AE52-4203-9155-65C4258A32D1}" type="datetimeFigureOut">
               <a:rPr lang="en-US" smtClean="0"/>
-              <a:t>6/5/23</a:t>
+              <a:t>6/7/23</a:t>
             </a:fld>
             <a:endParaRPr lang="en-US"/>
           </a:p>
@@ -2827,7 +2827,7 @@
           <a:p>
             <a:fld id="{82E1281C-38DA-4818-8C55-31099151AAF6}" type="datetimeFigureOut">
               <a:rPr lang="id-ID" smtClean="0"/>
-              <a:t>05/06/23</a:t>
+              <a:t>07/06/23</a:t>
             </a:fld>
             <a:endParaRPr lang="id-ID"/>
           </a:p>
@@ -2997,7 +2997,7 @@
           <a:p>
             <a:fld id="{82E1281C-38DA-4818-8C55-31099151AAF6}" type="datetimeFigureOut">
               <a:rPr lang="id-ID" smtClean="0"/>
-              <a:t>05/06/23</a:t>
+              <a:t>07/06/23</a:t>
             </a:fld>
             <a:endParaRPr lang="id-ID"/>
           </a:p>
@@ -3177,7 +3177,7 @@
           <a:p>
             <a:fld id="{82E1281C-38DA-4818-8C55-31099151AAF6}" type="datetimeFigureOut">
               <a:rPr lang="id-ID" smtClean="0"/>
-              <a:t>05/06/23</a:t>
+              <a:t>07/06/23</a:t>
             </a:fld>
             <a:endParaRPr lang="id-ID"/>
           </a:p>
@@ -4248,7 +4248,7 @@
                 </a:solidFill>
               </a:rPr>
               <a:pPr/>
-              <a:t>6/5/23</a:t>
+              <a:t>6/7/23</a:t>
             </a:fld>
             <a:endParaRPr lang="en-US">
               <a:solidFill>
@@ -4478,7 +4478,7 @@
                 </a:solidFill>
               </a:rPr>
               <a:pPr/>
-              <a:t>6/5/23</a:t>
+              <a:t>6/7/23</a:t>
             </a:fld>
             <a:endParaRPr lang="en-US">
               <a:solidFill>
@@ -4785,7 +4785,7 @@
                 </a:solidFill>
               </a:rPr>
               <a:pPr/>
-              <a:t>6/5/23</a:t>
+              <a:t>6/7/23</a:t>
             </a:fld>
             <a:endParaRPr lang="en-US">
               <a:solidFill>
@@ -5082,7 +5082,7 @@
                 </a:solidFill>
               </a:rPr>
               <a:pPr/>
-              <a:t>6/5/23</a:t>
+              <a:t>6/7/23</a:t>
             </a:fld>
             <a:endParaRPr lang="en-US">
               <a:solidFill>
@@ -5526,7 +5526,7 @@
                 </a:solidFill>
               </a:rPr>
               <a:pPr/>
-              <a:t>6/5/23</a:t>
+              <a:t>6/7/23</a:t>
             </a:fld>
             <a:endParaRPr lang="en-US">
               <a:solidFill>
@@ -5699,7 +5699,7 @@
                 </a:solidFill>
               </a:rPr>
               <a:pPr/>
-              <a:t>6/5/23</a:t>
+              <a:t>6/7/23</a:t>
             </a:fld>
             <a:endParaRPr lang="en-US">
               <a:solidFill>
@@ -5844,7 +5844,7 @@
                 </a:solidFill>
               </a:rPr>
               <a:pPr/>
-              <a:t>6/5/23</a:t>
+              <a:t>6/7/23</a:t>
             </a:fld>
             <a:endParaRPr lang="en-US">
               <a:solidFill>
@@ -6141,7 +6141,7 @@
           <a:p>
             <a:fld id="{82E1281C-38DA-4818-8C55-31099151AAF6}" type="datetimeFigureOut">
               <a:rPr lang="id-ID" smtClean="0"/>
-              <a:t>05/06/23</a:t>
+              <a:t>07/06/23</a:t>
             </a:fld>
             <a:endParaRPr lang="id-ID"/>
           </a:p>
@@ -6447,7 +6447,7 @@
                 </a:solidFill>
               </a:rPr>
               <a:pPr/>
-              <a:t>6/5/23</a:t>
+              <a:t>6/7/23</a:t>
             </a:fld>
             <a:endParaRPr lang="en-US">
               <a:solidFill>
@@ -6767,7 +6767,7 @@
                 </a:solidFill>
               </a:rPr>
               <a:pPr/>
-              <a:t>6/5/23</a:t>
+              <a:t>6/7/23</a:t>
             </a:fld>
             <a:endParaRPr lang="en-US">
               <a:solidFill>
@@ -6997,7 +6997,7 @@
                 </a:solidFill>
               </a:rPr>
               <a:pPr/>
-              <a:t>6/5/23</a:t>
+              <a:t>6/7/23</a:t>
             </a:fld>
             <a:endParaRPr lang="en-US">
               <a:solidFill>
@@ -7237,7 +7237,7 @@
                 </a:solidFill>
               </a:rPr>
               <a:pPr/>
-              <a:t>6/5/23</a:t>
+              <a:t>6/7/23</a:t>
             </a:fld>
             <a:endParaRPr lang="en-US">
               <a:solidFill>
@@ -7410,7 +7410,7 @@
                 </a:solidFill>
               </a:rPr>
               <a:pPr/>
-              <a:t>6/5/23</a:t>
+              <a:t>6/7/23</a:t>
             </a:fld>
             <a:endParaRPr lang="en-US">
               <a:solidFill>
@@ -7693,7 +7693,7 @@
           <a:p>
             <a:fld id="{82E1281C-38DA-4818-8C55-31099151AAF6}" type="datetimeFigureOut">
               <a:rPr lang="id-ID" smtClean="0"/>
-              <a:t>05/06/23</a:t>
+              <a:t>07/06/23</a:t>
             </a:fld>
             <a:endParaRPr lang="id-ID"/>
           </a:p>
@@ -7925,7 +7925,7 @@
           <a:p>
             <a:fld id="{82E1281C-38DA-4818-8C55-31099151AAF6}" type="datetimeFigureOut">
               <a:rPr lang="id-ID" smtClean="0"/>
-              <a:t>05/06/23</a:t>
+              <a:t>07/06/23</a:t>
             </a:fld>
             <a:endParaRPr lang="id-ID"/>
           </a:p>
@@ -8292,7 +8292,7 @@
           <a:p>
             <a:fld id="{82E1281C-38DA-4818-8C55-31099151AAF6}" type="datetimeFigureOut">
               <a:rPr lang="id-ID" smtClean="0"/>
-              <a:t>05/06/23</a:t>
+              <a:t>07/06/23</a:t>
             </a:fld>
             <a:endParaRPr lang="id-ID"/>
           </a:p>
@@ -8410,7 +8410,7 @@
           <a:p>
             <a:fld id="{82E1281C-38DA-4818-8C55-31099151AAF6}" type="datetimeFigureOut">
               <a:rPr lang="id-ID" smtClean="0"/>
-              <a:t>05/06/23</a:t>
+              <a:t>07/06/23</a:t>
             </a:fld>
             <a:endParaRPr lang="id-ID"/>
           </a:p>
@@ -8505,7 +8505,7 @@
           <a:p>
             <a:fld id="{82E1281C-38DA-4818-8C55-31099151AAF6}" type="datetimeFigureOut">
               <a:rPr lang="id-ID" smtClean="0"/>
-              <a:t>05/06/23</a:t>
+              <a:t>07/06/23</a:t>
             </a:fld>
             <a:endParaRPr lang="id-ID"/>
           </a:p>
@@ -8782,7 +8782,7 @@
           <a:p>
             <a:fld id="{82E1281C-38DA-4818-8C55-31099151AAF6}" type="datetimeFigureOut">
               <a:rPr lang="id-ID" smtClean="0"/>
-              <a:t>05/06/23</a:t>
+              <a:t>07/06/23</a:t>
             </a:fld>
             <a:endParaRPr lang="id-ID"/>
           </a:p>
@@ -9035,7 +9035,7 @@
           <a:p>
             <a:fld id="{82E1281C-38DA-4818-8C55-31099151AAF6}" type="datetimeFigureOut">
               <a:rPr lang="id-ID" smtClean="0"/>
-              <a:t>05/06/23</a:t>
+              <a:t>07/06/23</a:t>
             </a:fld>
             <a:endParaRPr lang="id-ID"/>
           </a:p>
@@ -9257,7 +9257,7 @@
           <a:p>
             <a:fld id="{82E1281C-38DA-4818-8C55-31099151AAF6}" type="datetimeFigureOut">
               <a:rPr lang="id-ID" smtClean="0"/>
-              <a:t>05/06/23</a:t>
+              <a:t>07/06/23</a:t>
             </a:fld>
             <a:endParaRPr lang="id-ID"/>
           </a:p>
@@ -9830,7 +9830,7 @@
                 </a:solidFill>
               </a:rPr>
               <a:pPr/>
-              <a:t>6/5/23</a:t>
+              <a:t>6/7/23</a:t>
             </a:fld>
             <a:endParaRPr lang="en-US">
               <a:solidFill>
@@ -17045,8 +17045,8 @@
         </p:blipFill>
         <p:spPr>
           <a:xfrm>
-            <a:off x="1478465" y="2134800"/>
-            <a:ext cx="9235069" cy="2588400"/>
+            <a:off x="254572" y="2128001"/>
+            <a:ext cx="11682855" cy="3274464"/>
           </a:xfrm>
           <a:prstGeom prst="rect">
             <a:avLst/>
@@ -24563,12 +24563,6 @@
 </file>
 
 <file path=customXml/item1.xml><?xml version="1.0" encoding="utf-8"?>
-<p:properties xmlns:p="http://schemas.microsoft.com/office/2006/metadata/properties" xmlns:xsi="http://www.w3.org/2001/XMLSchema-instance" xmlns:pc="http://schemas.microsoft.com/office/infopath/2007/PartnerControls">
-  <documentManagement/>
-</p:properties>
-</file>
-
-<file path=customXml/item2.xml><?xml version="1.0" encoding="utf-8"?>
 <ct:contentTypeSchema xmlns:ct="http://schemas.microsoft.com/office/2006/metadata/contentType" xmlns:ma="http://schemas.microsoft.com/office/2006/metadata/properties/metaAttributes" ct:_="" ma:_="" ma:contentTypeName="Dokumen" ma:contentTypeID="0x010100E578BFB713B0A04AA9CB3FB0E09BB096" ma:contentTypeVersion="8" ma:contentTypeDescription="Buat sebuah dokumen baru." ma:contentTypeScope="" ma:versionID="b12db5772b421c3d97e5e8cc52461df1">
   <xsd:schema xmlns:xsd="http://www.w3.org/2001/XMLSchema" xmlns:xs="http://www.w3.org/2001/XMLSchema" xmlns:p="http://schemas.microsoft.com/office/2006/metadata/properties" xmlns:ns3="d27b1e0a-a80f-43b3-a72c-03febd3edde5" targetNamespace="http://schemas.microsoft.com/office/2006/metadata/properties" ma:root="true" ma:fieldsID="93b8b61b0ccf34e75e41c3c949ba1e0b" ns3:_="">
     <xsd:import namespace="d27b1e0a-a80f-43b3-a72c-03febd3edde5"/>
@@ -24738,6 +24732,12 @@
 </ct:contentTypeSchema>
 </file>
 
+<file path=customXml/item2.xml><?xml version="1.0" encoding="utf-8"?>
+<p:properties xmlns:p="http://schemas.microsoft.com/office/2006/metadata/properties" xmlns:xsi="http://www.w3.org/2001/XMLSchema-instance" xmlns:pc="http://schemas.microsoft.com/office/infopath/2007/PartnerControls">
+  <documentManagement/>
+</p:properties>
+</file>
+
 <file path=customXml/item3.xml><?xml version="1.0" encoding="utf-8"?>
 <?mso-contentType ?>
 <FormTemplates xmlns="http://schemas.microsoft.com/sharepoint/v3/contenttype/forms">
@@ -24748,22 +24748,6 @@
 </file>
 
 <file path=customXml/itemProps1.xml><?xml version="1.0" encoding="utf-8"?>
-<ds:datastoreItem xmlns:ds="http://schemas.openxmlformats.org/officeDocument/2006/customXml" ds:itemID="{CD9CB790-CC05-41EE-8468-36831EC64B78}">
-  <ds:schemaRefs>
-    <ds:schemaRef ds:uri="http://schemas.openxmlformats.org/package/2006/metadata/core-properties"/>
-    <ds:schemaRef ds:uri="http://schemas.microsoft.com/office/2006/documentManagement/types"/>
-    <ds:schemaRef ds:uri="http://schemas.microsoft.com/office/infopath/2007/PartnerControls"/>
-    <ds:schemaRef ds:uri="d27b1e0a-a80f-43b3-a72c-03febd3edde5"/>
-    <ds:schemaRef ds:uri="http://schemas.microsoft.com/office/2006/metadata/properties"/>
-    <ds:schemaRef ds:uri="http://www.w3.org/XML/1998/namespace"/>
-    <ds:schemaRef ds:uri="http://purl.org/dc/dcmitype/"/>
-    <ds:schemaRef ds:uri="http://purl.org/dc/terms/"/>
-    <ds:schemaRef ds:uri="http://purl.org/dc/elements/1.1/"/>
-  </ds:schemaRefs>
-</ds:datastoreItem>
-</file>
-
-<file path=customXml/itemProps2.xml><?xml version="1.0" encoding="utf-8"?>
 <ds:datastoreItem xmlns:ds="http://schemas.openxmlformats.org/officeDocument/2006/customXml" ds:itemID="{74C6180C-AB73-4F26-8914-63FC793B0B03}">
   <ds:schemaRefs>
     <ds:schemaRef ds:uri="http://schemas.microsoft.com/office/2006/metadata/contentType"/>
@@ -24782,6 +24766,22 @@
 </ds:datastoreItem>
 </file>
 
+<file path=customXml/itemProps2.xml><?xml version="1.0" encoding="utf-8"?>
+<ds:datastoreItem xmlns:ds="http://schemas.openxmlformats.org/officeDocument/2006/customXml" ds:itemID="{CD9CB790-CC05-41EE-8468-36831EC64B78}">
+  <ds:schemaRefs>
+    <ds:schemaRef ds:uri="http://schemas.openxmlformats.org/package/2006/metadata/core-properties"/>
+    <ds:schemaRef ds:uri="http://schemas.microsoft.com/office/2006/documentManagement/types"/>
+    <ds:schemaRef ds:uri="http://schemas.microsoft.com/office/infopath/2007/PartnerControls"/>
+    <ds:schemaRef ds:uri="d27b1e0a-a80f-43b3-a72c-03febd3edde5"/>
+    <ds:schemaRef ds:uri="http://schemas.microsoft.com/office/2006/metadata/properties"/>
+    <ds:schemaRef ds:uri="http://www.w3.org/XML/1998/namespace"/>
+    <ds:schemaRef ds:uri="http://purl.org/dc/dcmitype/"/>
+    <ds:schemaRef ds:uri="http://purl.org/dc/terms/"/>
+    <ds:schemaRef ds:uri="http://purl.org/dc/elements/1.1/"/>
+  </ds:schemaRefs>
+</ds:datastoreItem>
+</file>
+
 <file path=customXml/itemProps3.xml><?xml version="1.0" encoding="utf-8"?>
 <ds:datastoreItem xmlns:ds="http://schemas.openxmlformats.org/officeDocument/2006/customXml" ds:itemID="{6F28412E-6216-429D-9368-A2DF44D347EE}">
   <ds:schemaRefs>

</xml_diff>

<commit_message>
feat: revisi buku & ppt
</commit_message>
<xml_diff>
--- a/Template presentasi TA.pptx
+++ b/Template presentasi TA.pptx
@@ -6,10 +6,10 @@
     <p:sldMasterId id="2147483808" r:id="rId5"/>
   </p:sldMasterIdLst>
   <p:notesMasterIdLst>
-    <p:notesMasterId r:id="rId29"/>
+    <p:notesMasterId r:id="rId28"/>
   </p:notesMasterIdLst>
   <p:handoutMasterIdLst>
-    <p:handoutMasterId r:id="rId30"/>
+    <p:handoutMasterId r:id="rId29"/>
   </p:handoutMasterIdLst>
   <p:sldIdLst>
     <p:sldId id="634" r:id="rId6"/>
@@ -32,9 +32,8 @@
     <p:sldId id="678" r:id="rId23"/>
     <p:sldId id="679" r:id="rId24"/>
     <p:sldId id="680" r:id="rId25"/>
-    <p:sldId id="682" r:id="rId26"/>
-    <p:sldId id="681" r:id="rId27"/>
-    <p:sldId id="653" r:id="rId28"/>
+    <p:sldId id="681" r:id="rId26"/>
+    <p:sldId id="653" r:id="rId27"/>
   </p:sldIdLst>
   <p:sldSz cx="12192000" cy="6858000"/>
   <p:notesSz cx="7315200" cy="9601200"/>
@@ -158,7 +157,6 @@
             <p14:sldId id="678"/>
             <p14:sldId id="679"/>
             <p14:sldId id="680"/>
-            <p14:sldId id="682"/>
             <p14:sldId id="681"/>
             <p14:sldId id="653"/>
           </p14:sldIdLst>
@@ -324,7 +322,7 @@
           <a:p>
             <a:fld id="{2D8DF117-F36D-4197-BD9C-D7ED3849AC71}" type="datetimeFigureOut">
               <a:rPr lang="en-US" smtClean="0"/>
-              <a:t>6/7/23</a:t>
+              <a:t>6/8/2023</a:t>
             </a:fld>
             <a:endParaRPr lang="en-US"/>
           </a:p>
@@ -489,7 +487,7 @@
           <a:p>
             <a:fld id="{F2C69B06-AE52-4203-9155-65C4258A32D1}" type="datetimeFigureOut">
               <a:rPr lang="en-US" smtClean="0"/>
-              <a:t>6/7/23</a:t>
+              <a:t>6/8/2023</a:t>
             </a:fld>
             <a:endParaRPr lang="en-US"/>
           </a:p>
@@ -1213,24 +1211,16 @@
               <a:defRPr/>
             </a:pPr>
             <a:r>
-              <a:rPr lang="en-US" dirty="0"/>
-              <a:t>The study addressed the problem of detecting human emotions from audio data by integrating the Transformer Encoder and CNN architectures. The </a:t>
-            </a:r>
-            <a:r>
-              <a:rPr lang="en-US" dirty="0" err="1"/>
-              <a:t>Pararel</a:t>
-            </a:r>
-            <a:r>
-              <a:rPr lang="en-US" dirty="0"/>
-              <a:t> Transformer Encoder with CNN Architecture model demonstrated improved performance in emotion detection by capturing global dependencies and local patterns in audio features. Optimization techniques, including fine-tuning hyperparameters and applying regularization methods, further enhanced accuracy. Comparative analysis with SVM, </a:t>
-            </a:r>
-            <a:r>
-              <a:rPr lang="en-US" dirty="0" err="1"/>
+              <a:rPr lang="en-US" sz="1200" dirty="0"/>
+              <a:t>The models being compared include SVM, </a:t>
+            </a:r>
+            <a:r>
+              <a:rPr lang="en-US" sz="1200" dirty="0" err="1"/>
               <a:t>LeNet</a:t>
             </a:r>
             <a:r>
-              <a:rPr lang="en-US" dirty="0"/>
-              <a:t>-based CNN, and CRNN models revealed that the Parallel Transformer Encoder with CNN Architecture achieved the highest accuracy, followed by the SVM model. The study highlights the effectiveness of the proposed model for emotion detection from audio data.</a:t>
+              <a:rPr lang="en-US" sz="1200" dirty="0"/>
+              <a:t> CNN, CRNN, and the Parallel Transformer Encoder with CNN Architecture. This section highlight the model with the highest accuracy among all the models compared.</a:t>
             </a:r>
           </a:p>
           <a:p>
@@ -1255,7 +1245,7 @@
           <a:p>
             <a:fld id="{E10FB84E-2805-4468-A00F-CFA6F38630CE}" type="slidenum">
               <a:rPr lang="en-US" smtClean="0"/>
-              <a:t>21</a:t>
+              <a:t>20</a:t>
             </a:fld>
             <a:endParaRPr lang="en-US"/>
           </a:p>
@@ -1264,7 +1254,7 @@
     </p:spTree>
     <p:extLst>
       <p:ext uri="{BB962C8B-B14F-4D97-AF65-F5344CB8AC3E}">
-        <p14:creationId xmlns:p14="http://schemas.microsoft.com/office/powerpoint/2010/main" val="2062396258"/>
+        <p14:creationId xmlns:p14="http://schemas.microsoft.com/office/powerpoint/2010/main" val="193889842"/>
       </p:ext>
     </p:extLst>
   </p:cSld>
@@ -1318,46 +1308,121 @@
           <a:bodyPr/>
           <a:lstStyle/>
           <a:p>
-            <a:pPr marL="0" marR="0" lvl="0" indent="0" algn="l" defTabSz="914400" rtl="0" eaLnBrk="1" fontAlgn="auto" latinLnBrk="0" hangingPunct="1">
-              <a:lnSpc>
-                <a:spcPct val="100000"/>
-              </a:lnSpc>
-              <a:spcBef>
-                <a:spcPts val="0"/>
-              </a:spcBef>
-              <a:spcAft>
-                <a:spcPts val="0"/>
-              </a:spcAft>
-              <a:buClrTx/>
-              <a:buSzTx/>
-              <a:buFontTx/>
-              <a:buNone/>
-              <a:tabLst/>
-              <a:defRPr/>
+            <a:pPr>
+              <a:spcBef>
+                <a:spcPts val="0"/>
+              </a:spcBef>
+              <a:spcAft>
+                <a:spcPts val="0"/>
+              </a:spcAft>
+              <a:buFont typeface="Arial" panose="020B0604020202020204" pitchFamily="34" charset="0"/>
+              <a:buChar char="•"/>
             </a:pPr>
             <a:r>
-              <a:rPr lang="en-US" dirty="0"/>
-              <a:t>The study addressed the problem of detecting human emotions from audio data by integrating the Transformer Encoder and CNN architectures. The </a:t>
-            </a:r>
-            <a:r>
-              <a:rPr lang="en-US" dirty="0" err="1"/>
-              <a:t>Pararel</a:t>
-            </a:r>
-            <a:r>
-              <a:rPr lang="en-US" dirty="0"/>
-              <a:t> Transformer Encoder with CNN Architecture model demonstrated improved performance in emotion detection by capturing global dependencies and local patterns in audio features. Optimization techniques, including fine-tuning hyperparameters and applying regularization methods, further enhanced accuracy. Comparative analysis with SVM, </a:t>
-            </a:r>
-            <a:r>
-              <a:rPr lang="en-US" dirty="0" err="1"/>
+              <a:rPr lang="en-US" dirty="0">
+                <a:solidFill>
+                  <a:srgbClr val="0E101A"/>
+                </a:solidFill>
+                <a:effectLst/>
+              </a:rPr>
+              <a:t> To combine the Transformer Encoder and CNN for detecting human emotions from audio data, the study utilized a model architecture that included one block of Transformer Encoder with self-attention layers, followed by a feedforward layer. Additionally, two blocks resembling the CNN-based architecture of </a:t>
+            </a:r>
+            <a:r>
+              <a:rPr lang="en-US" dirty="0" err="1">
+                <a:solidFill>
+                  <a:srgbClr val="0E101A"/>
+                </a:solidFill>
+                <a:effectLst/>
+              </a:rPr>
               <a:t>LeNet</a:t>
             </a:r>
             <a:r>
-              <a:rPr lang="en-US" dirty="0"/>
-              <a:t>-based CNN, and CRNN models revealed that the Parallel Transformer Encoder with CNN Architecture achieved the highest accuracy, followed by the SVM model. The study highlights the effectiveness of the proposed model for emotion detection from audio data.</a:t>
-            </a:r>
-          </a:p>
-          <a:p>
-            <a:endParaRPr lang="en-US" dirty="0"/>
+              <a:rPr lang="en-US" dirty="0">
+                <a:solidFill>
+                  <a:srgbClr val="0E101A"/>
+                </a:solidFill>
+                <a:effectLst/>
+              </a:rPr>
+              <a:t> were employed, consisting of a 3×3 convolution layer, an ELU activation function, batch normalization, and a pooling layer for </a:t>
+            </a:r>
+            <a:r>
+              <a:rPr lang="en-US" dirty="0" err="1">
+                <a:solidFill>
+                  <a:srgbClr val="0E101A"/>
+                </a:solidFill>
+                <a:effectLst/>
+              </a:rPr>
+              <a:t>downsampling</a:t>
+            </a:r>
+            <a:r>
+              <a:rPr lang="en-US" dirty="0">
+                <a:solidFill>
+                  <a:srgbClr val="0E101A"/>
+                </a:solidFill>
+                <a:effectLst/>
+              </a:rPr>
+              <a:t> the feature maps. The output tensors of these blocks were combined using a dense layer, and the SoftMax activation function was applied to convert prediction scores into a probability distribution over the emotional states in the dataset.</a:t>
+            </a:r>
+          </a:p>
+          <a:p>
+            <a:pPr>
+              <a:spcBef>
+                <a:spcPts val="0"/>
+              </a:spcBef>
+              <a:spcAft>
+                <a:spcPts val="0"/>
+              </a:spcAft>
+              <a:buFont typeface="Arial" panose="020B0604020202020204" pitchFamily="34" charset="0"/>
+              <a:buChar char="•"/>
+            </a:pPr>
+            <a:r>
+              <a:rPr lang="en-US" dirty="0">
+                <a:solidFill>
+                  <a:srgbClr val="0E101A"/>
+                </a:solidFill>
+                <a:effectLst/>
+              </a:rPr>
+              <a:t> Optimization techniques include fine-tuning hyperparameters (such as the learning rate, batch size, and number of layers in the model) and applying regularization methods (such as dropout or weight decay), further enhancing accuracy.</a:t>
+            </a:r>
+          </a:p>
+          <a:p>
+            <a:pPr>
+              <a:spcBef>
+                <a:spcPts val="0"/>
+              </a:spcBef>
+              <a:spcAft>
+                <a:spcPts val="0"/>
+              </a:spcAft>
+              <a:buFont typeface="Arial" panose="020B0604020202020204" pitchFamily="34" charset="0"/>
+              <a:buChar char="•"/>
+            </a:pPr>
+            <a:r>
+              <a:rPr lang="en-US" dirty="0">
+                <a:solidFill>
+                  <a:srgbClr val="0E101A"/>
+                </a:solidFill>
+                <a:effectLst/>
+              </a:rPr>
+              <a:t> Comparative analysis with SVM, </a:t>
+            </a:r>
+            <a:r>
+              <a:rPr lang="en-US" dirty="0" err="1">
+                <a:solidFill>
+                  <a:srgbClr val="0E101A"/>
+                </a:solidFill>
+                <a:effectLst/>
+              </a:rPr>
+              <a:t>LeNet</a:t>
+            </a:r>
+            <a:r>
+              <a:rPr lang="en-US" dirty="0">
+                <a:solidFill>
+                  <a:srgbClr val="0E101A"/>
+                </a:solidFill>
+                <a:effectLst/>
+              </a:rPr>
+              <a:t>-based CNN, and CRNN models revealed that the Parallel Transformer Encoder with CNN Architecture achieved the highest accuracy, followed by the SVM model.</a:t>
+            </a:r>
           </a:p>
         </p:txBody>
       </p:sp>
@@ -1378,7 +1443,7 @@
           <a:p>
             <a:fld id="{E10FB84E-2805-4468-A00F-CFA6F38630CE}" type="slidenum">
               <a:rPr lang="en-US" smtClean="0"/>
-              <a:t>22</a:t>
+              <a:t>21</a:t>
             </a:fld>
             <a:endParaRPr lang="en-US"/>
           </a:p>
@@ -2827,7 +2892,7 @@
           <a:p>
             <a:fld id="{82E1281C-38DA-4818-8C55-31099151AAF6}" type="datetimeFigureOut">
               <a:rPr lang="id-ID" smtClean="0"/>
-              <a:t>07/06/23</a:t>
+              <a:t>08/06/2023</a:t>
             </a:fld>
             <a:endParaRPr lang="id-ID"/>
           </a:p>
@@ -2997,7 +3062,7 @@
           <a:p>
             <a:fld id="{82E1281C-38DA-4818-8C55-31099151AAF6}" type="datetimeFigureOut">
               <a:rPr lang="id-ID" smtClean="0"/>
-              <a:t>07/06/23</a:t>
+              <a:t>08/06/2023</a:t>
             </a:fld>
             <a:endParaRPr lang="id-ID"/>
           </a:p>
@@ -3177,7 +3242,7 @@
           <a:p>
             <a:fld id="{82E1281C-38DA-4818-8C55-31099151AAF6}" type="datetimeFigureOut">
               <a:rPr lang="id-ID" smtClean="0"/>
-              <a:t>07/06/23</a:t>
+              <a:t>08/06/2023</a:t>
             </a:fld>
             <a:endParaRPr lang="id-ID"/>
           </a:p>
@@ -4248,7 +4313,7 @@
                 </a:solidFill>
               </a:rPr>
               <a:pPr/>
-              <a:t>6/7/23</a:t>
+              <a:t>6/8/2023</a:t>
             </a:fld>
             <a:endParaRPr lang="en-US">
               <a:solidFill>
@@ -4478,7 +4543,7 @@
                 </a:solidFill>
               </a:rPr>
               <a:pPr/>
-              <a:t>6/7/23</a:t>
+              <a:t>6/8/2023</a:t>
             </a:fld>
             <a:endParaRPr lang="en-US">
               <a:solidFill>
@@ -4785,7 +4850,7 @@
                 </a:solidFill>
               </a:rPr>
               <a:pPr/>
-              <a:t>6/7/23</a:t>
+              <a:t>6/8/2023</a:t>
             </a:fld>
             <a:endParaRPr lang="en-US">
               <a:solidFill>
@@ -5082,7 +5147,7 @@
                 </a:solidFill>
               </a:rPr>
               <a:pPr/>
-              <a:t>6/7/23</a:t>
+              <a:t>6/8/2023</a:t>
             </a:fld>
             <a:endParaRPr lang="en-US">
               <a:solidFill>
@@ -5526,7 +5591,7 @@
                 </a:solidFill>
               </a:rPr>
               <a:pPr/>
-              <a:t>6/7/23</a:t>
+              <a:t>6/8/2023</a:t>
             </a:fld>
             <a:endParaRPr lang="en-US">
               <a:solidFill>
@@ -5699,7 +5764,7 @@
                 </a:solidFill>
               </a:rPr>
               <a:pPr/>
-              <a:t>6/7/23</a:t>
+              <a:t>6/8/2023</a:t>
             </a:fld>
             <a:endParaRPr lang="en-US">
               <a:solidFill>
@@ -5844,7 +5909,7 @@
                 </a:solidFill>
               </a:rPr>
               <a:pPr/>
-              <a:t>6/7/23</a:t>
+              <a:t>6/8/2023</a:t>
             </a:fld>
             <a:endParaRPr lang="en-US">
               <a:solidFill>
@@ -6141,7 +6206,7 @@
           <a:p>
             <a:fld id="{82E1281C-38DA-4818-8C55-31099151AAF6}" type="datetimeFigureOut">
               <a:rPr lang="id-ID" smtClean="0"/>
-              <a:t>07/06/23</a:t>
+              <a:t>08/06/2023</a:t>
             </a:fld>
             <a:endParaRPr lang="id-ID"/>
           </a:p>
@@ -6447,7 +6512,7 @@
                 </a:solidFill>
               </a:rPr>
               <a:pPr/>
-              <a:t>6/7/23</a:t>
+              <a:t>6/8/2023</a:t>
             </a:fld>
             <a:endParaRPr lang="en-US">
               <a:solidFill>
@@ -6767,7 +6832,7 @@
                 </a:solidFill>
               </a:rPr>
               <a:pPr/>
-              <a:t>6/7/23</a:t>
+              <a:t>6/8/2023</a:t>
             </a:fld>
             <a:endParaRPr lang="en-US">
               <a:solidFill>
@@ -6997,7 +7062,7 @@
                 </a:solidFill>
               </a:rPr>
               <a:pPr/>
-              <a:t>6/7/23</a:t>
+              <a:t>6/8/2023</a:t>
             </a:fld>
             <a:endParaRPr lang="en-US">
               <a:solidFill>
@@ -7237,7 +7302,7 @@
                 </a:solidFill>
               </a:rPr>
               <a:pPr/>
-              <a:t>6/7/23</a:t>
+              <a:t>6/8/2023</a:t>
             </a:fld>
             <a:endParaRPr lang="en-US">
               <a:solidFill>
@@ -7410,7 +7475,7 @@
                 </a:solidFill>
               </a:rPr>
               <a:pPr/>
-              <a:t>6/7/23</a:t>
+              <a:t>6/8/2023</a:t>
             </a:fld>
             <a:endParaRPr lang="en-US">
               <a:solidFill>
@@ -7693,7 +7758,7 @@
           <a:p>
             <a:fld id="{82E1281C-38DA-4818-8C55-31099151AAF6}" type="datetimeFigureOut">
               <a:rPr lang="id-ID" smtClean="0"/>
-              <a:t>07/06/23</a:t>
+              <a:t>08/06/2023</a:t>
             </a:fld>
             <a:endParaRPr lang="id-ID"/>
           </a:p>
@@ -7925,7 +7990,7 @@
           <a:p>
             <a:fld id="{82E1281C-38DA-4818-8C55-31099151AAF6}" type="datetimeFigureOut">
               <a:rPr lang="id-ID" smtClean="0"/>
-              <a:t>07/06/23</a:t>
+              <a:t>08/06/2023</a:t>
             </a:fld>
             <a:endParaRPr lang="id-ID"/>
           </a:p>
@@ -8292,7 +8357,7 @@
           <a:p>
             <a:fld id="{82E1281C-38DA-4818-8C55-31099151AAF6}" type="datetimeFigureOut">
               <a:rPr lang="id-ID" smtClean="0"/>
-              <a:t>07/06/23</a:t>
+              <a:t>08/06/2023</a:t>
             </a:fld>
             <a:endParaRPr lang="id-ID"/>
           </a:p>
@@ -8410,7 +8475,7 @@
           <a:p>
             <a:fld id="{82E1281C-38DA-4818-8C55-31099151AAF6}" type="datetimeFigureOut">
               <a:rPr lang="id-ID" smtClean="0"/>
-              <a:t>07/06/23</a:t>
+              <a:t>08/06/2023</a:t>
             </a:fld>
             <a:endParaRPr lang="id-ID"/>
           </a:p>
@@ -8505,7 +8570,7 @@
           <a:p>
             <a:fld id="{82E1281C-38DA-4818-8C55-31099151AAF6}" type="datetimeFigureOut">
               <a:rPr lang="id-ID" smtClean="0"/>
-              <a:t>07/06/23</a:t>
+              <a:t>08/06/2023</a:t>
             </a:fld>
             <a:endParaRPr lang="id-ID"/>
           </a:p>
@@ -8782,7 +8847,7 @@
           <a:p>
             <a:fld id="{82E1281C-38DA-4818-8C55-31099151AAF6}" type="datetimeFigureOut">
               <a:rPr lang="id-ID" smtClean="0"/>
-              <a:t>07/06/23</a:t>
+              <a:t>08/06/2023</a:t>
             </a:fld>
             <a:endParaRPr lang="id-ID"/>
           </a:p>
@@ -9035,7 +9100,7 @@
           <a:p>
             <a:fld id="{82E1281C-38DA-4818-8C55-31099151AAF6}" type="datetimeFigureOut">
               <a:rPr lang="id-ID" smtClean="0"/>
-              <a:t>07/06/23</a:t>
+              <a:t>08/06/2023</a:t>
             </a:fld>
             <a:endParaRPr lang="id-ID"/>
           </a:p>
@@ -9257,7 +9322,7 @@
           <a:p>
             <a:fld id="{82E1281C-38DA-4818-8C55-31099151AAF6}" type="datetimeFigureOut">
               <a:rPr lang="id-ID" smtClean="0"/>
-              <a:t>07/06/23</a:t>
+              <a:t>08/06/2023</a:t>
             </a:fld>
             <a:endParaRPr lang="id-ID"/>
           </a:p>
@@ -9830,7 +9895,7 @@
                 </a:solidFill>
               </a:rPr>
               <a:pPr/>
-              <a:t>6/7/23</a:t>
+              <a:t>6/8/2023</a:t>
             </a:fld>
             <a:endParaRPr lang="en-US">
               <a:solidFill>
@@ -13596,8 +13661,8 @@
         </p:blipFill>
         <p:spPr>
           <a:xfrm>
-            <a:off x="1775424" y="2258844"/>
-            <a:ext cx="3755759" cy="3045763"/>
+            <a:off x="1053195" y="1898796"/>
+            <a:ext cx="4772770" cy="3870516"/>
           </a:xfrm>
           <a:prstGeom prst="rect">
             <a:avLst/>
@@ -13630,8 +13695,8 @@
         </p:blipFill>
         <p:spPr>
           <a:xfrm>
-            <a:off x="6546060" y="2258844"/>
-            <a:ext cx="3788958" cy="3045763"/>
+            <a:off x="6276024" y="1898796"/>
+            <a:ext cx="4814959" cy="3870516"/>
           </a:xfrm>
           <a:prstGeom prst="rect">
             <a:avLst/>
@@ -13716,8 +13781,8 @@
         </p:blipFill>
         <p:spPr>
           <a:xfrm>
-            <a:off x="6699965" y="2258844"/>
-            <a:ext cx="3758184" cy="3044952"/>
+            <a:off x="6269539" y="1898796"/>
+            <a:ext cx="4777123" cy="3870516"/>
           </a:xfrm>
           <a:prstGeom prst="rect">
             <a:avLst/>
@@ -13750,8 +13815,8 @@
         </p:blipFill>
         <p:spPr>
           <a:xfrm>
-            <a:off x="1685412" y="2258844"/>
-            <a:ext cx="3758184" cy="3044952"/>
+            <a:off x="1145340" y="1898796"/>
+            <a:ext cx="4777123" cy="3870516"/>
           </a:xfrm>
           <a:prstGeom prst="rect">
             <a:avLst/>
@@ -13836,8 +13901,8 @@
         </p:blipFill>
         <p:spPr>
           <a:xfrm>
-            <a:off x="1800168" y="2258844"/>
-            <a:ext cx="3758184" cy="3044952"/>
+            <a:off x="1145340" y="1898796"/>
+            <a:ext cx="4773168" cy="3867912"/>
           </a:xfrm>
           <a:prstGeom prst="rect">
             <a:avLst/>
@@ -13870,8 +13935,8 @@
         </p:blipFill>
         <p:spPr>
           <a:xfrm>
-            <a:off x="6636072" y="2258844"/>
-            <a:ext cx="3758184" cy="3044952"/>
+            <a:off x="6275532" y="1883082"/>
+            <a:ext cx="4773168" cy="3867912"/>
           </a:xfrm>
           <a:prstGeom prst="rect">
             <a:avLst/>
@@ -14176,8 +14241,8 @@
         </p:blipFill>
         <p:spPr>
           <a:xfrm>
-            <a:off x="1530200" y="2217493"/>
-            <a:ext cx="3779367" cy="3062592"/>
+            <a:off x="335232" y="1448736"/>
+            <a:ext cx="5331772" cy="4320576"/>
           </a:xfrm>
           <a:prstGeom prst="rect">
             <a:avLst/>
@@ -14210,8 +14275,8 @@
         </p:blipFill>
         <p:spPr>
           <a:xfrm>
-            <a:off x="6456048" y="2631124"/>
-            <a:ext cx="3779367" cy="2235330"/>
+            <a:off x="6524998" y="2515530"/>
+            <a:ext cx="4140552" cy="2448955"/>
           </a:xfrm>
           <a:prstGeom prst="rect">
             <a:avLst/>
@@ -14296,8 +14361,8 @@
         </p:blipFill>
         <p:spPr>
           <a:xfrm>
-            <a:off x="6730118" y="2888928"/>
-            <a:ext cx="3702828" cy="1803927"/>
+            <a:off x="6366036" y="2708904"/>
+            <a:ext cx="4461797" cy="2173678"/>
           </a:xfrm>
           <a:prstGeom prst="rect">
             <a:avLst/>
@@ -14329,8 +14394,8 @@
         </p:blipFill>
         <p:spPr>
           <a:xfrm>
-            <a:off x="1574442" y="2168832"/>
-            <a:ext cx="3887442" cy="3153252"/>
+            <a:off x="245220" y="1358724"/>
+            <a:ext cx="5326561" cy="4320576"/>
           </a:xfrm>
           <a:prstGeom prst="rect">
             <a:avLst/>
@@ -14414,8 +14479,8 @@
         </p:blipFill>
         <p:spPr>
           <a:xfrm>
-            <a:off x="1505388" y="2061948"/>
-            <a:ext cx="4114407" cy="3334089"/>
+            <a:off x="335232" y="1448736"/>
+            <a:ext cx="5326362" cy="4316190"/>
           </a:xfrm>
           <a:prstGeom prst="rect">
             <a:avLst/>
@@ -14448,8 +14513,8 @@
         </p:blipFill>
         <p:spPr>
           <a:xfrm>
-            <a:off x="6906108" y="2655777"/>
-            <a:ext cx="3600480" cy="2146432"/>
+            <a:off x="6530408" y="2425176"/>
+            <a:ext cx="4140552" cy="2468397"/>
           </a:xfrm>
           <a:prstGeom prst="rect">
             <a:avLst/>
@@ -14506,7 +14571,7 @@
         </p:nvSpPr>
         <p:spPr>
           <a:xfrm>
-            <a:off x="2988600" y="1735402"/>
+            <a:off x="2988600" y="2535800"/>
             <a:ext cx="6214800" cy="893200"/>
           </a:xfrm>
           <a:prstGeom prst="rect">
@@ -14549,220 +14614,6 @@
           </a:p>
         </p:txBody>
       </p:sp>
-      <p:sp>
-        <p:nvSpPr>
-          <p:cNvPr id="9" name="Google Shape;277;p9">
-            <a:extLst>
-              <a:ext uri="{FF2B5EF4-FFF2-40B4-BE49-F238E27FC236}">
-                <a16:creationId xmlns:a16="http://schemas.microsoft.com/office/drawing/2014/main" id="{21F87AE8-D962-2CB0-1D30-AEB67B2E726B}"/>
-              </a:ext>
-            </a:extLst>
-          </p:cNvPr>
-          <p:cNvSpPr txBox="1">
-            <a:spLocks/>
-          </p:cNvSpPr>
-          <p:nvPr/>
-        </p:nvSpPr>
-        <p:spPr>
-          <a:xfrm>
-            <a:off x="2988600" y="2888928"/>
-            <a:ext cx="6214800" cy="1980257"/>
-          </a:xfrm>
-          <a:prstGeom prst="rect">
-            <a:avLst/>
-          </a:prstGeom>
-          <a:noFill/>
-          <a:ln>
-            <a:noFill/>
-          </a:ln>
-        </p:spPr>
-        <p:txBody>
-          <a:bodyPr spcFirstLastPara="1" vert="horz" wrap="square" lIns="121900" tIns="121900" rIns="121900" bIns="121900" rtlCol="0" anchor="ctr" anchorCtr="0">
-            <a:noAutofit/>
-          </a:bodyPr>
-          <a:lstStyle>
-            <a:lvl1pPr marL="228600" indent="-228600" algn="l" defTabSz="914400" rtl="0" eaLnBrk="1" latinLnBrk="0" hangingPunct="1">
-              <a:lnSpc>
-                <a:spcPct val="90000"/>
-              </a:lnSpc>
-              <a:spcBef>
-                <a:spcPts val="1000"/>
-              </a:spcBef>
-              <a:buFont typeface="Arial" panose="020B0604020202020204" pitchFamily="34" charset="0"/>
-              <a:buChar char="•"/>
-              <a:defRPr sz="2800" kern="1200">
-                <a:solidFill>
-                  <a:schemeClr val="tx1"/>
-                </a:solidFill>
-                <a:latin typeface="+mn-lt"/>
-                <a:ea typeface="+mn-ea"/>
-                <a:cs typeface="+mn-cs"/>
-              </a:defRPr>
-            </a:lvl1pPr>
-            <a:lvl2pPr marL="685800" indent="-228600" algn="l" defTabSz="914400" rtl="0" eaLnBrk="1" latinLnBrk="0" hangingPunct="1">
-              <a:lnSpc>
-                <a:spcPct val="90000"/>
-              </a:lnSpc>
-              <a:spcBef>
-                <a:spcPts val="500"/>
-              </a:spcBef>
-              <a:buFont typeface="Arial" panose="020B0604020202020204" pitchFamily="34" charset="0"/>
-              <a:buChar char="•"/>
-              <a:defRPr sz="2400" kern="1200">
-                <a:solidFill>
-                  <a:schemeClr val="tx1"/>
-                </a:solidFill>
-                <a:latin typeface="+mn-lt"/>
-                <a:ea typeface="+mn-ea"/>
-                <a:cs typeface="+mn-cs"/>
-              </a:defRPr>
-            </a:lvl2pPr>
-            <a:lvl3pPr marL="1143000" indent="-228600" algn="l" defTabSz="914400" rtl="0" eaLnBrk="1" latinLnBrk="0" hangingPunct="1">
-              <a:lnSpc>
-                <a:spcPct val="90000"/>
-              </a:lnSpc>
-              <a:spcBef>
-                <a:spcPts val="500"/>
-              </a:spcBef>
-              <a:buFont typeface="Arial" panose="020B0604020202020204" pitchFamily="34" charset="0"/>
-              <a:buChar char="•"/>
-              <a:defRPr sz="2000" kern="1200">
-                <a:solidFill>
-                  <a:schemeClr val="tx1"/>
-                </a:solidFill>
-                <a:latin typeface="+mn-lt"/>
-                <a:ea typeface="+mn-ea"/>
-                <a:cs typeface="+mn-cs"/>
-              </a:defRPr>
-            </a:lvl3pPr>
-            <a:lvl4pPr marL="1600200" indent="-228600" algn="l" defTabSz="914400" rtl="0" eaLnBrk="1" latinLnBrk="0" hangingPunct="1">
-              <a:lnSpc>
-                <a:spcPct val="90000"/>
-              </a:lnSpc>
-              <a:spcBef>
-                <a:spcPts val="500"/>
-              </a:spcBef>
-              <a:buFont typeface="Arial" panose="020B0604020202020204" pitchFamily="34" charset="0"/>
-              <a:buChar char="•"/>
-              <a:defRPr sz="1800" kern="1200">
-                <a:solidFill>
-                  <a:schemeClr val="tx1"/>
-                </a:solidFill>
-                <a:latin typeface="+mn-lt"/>
-                <a:ea typeface="+mn-ea"/>
-                <a:cs typeface="+mn-cs"/>
-              </a:defRPr>
-            </a:lvl4pPr>
-            <a:lvl5pPr marL="2057400" indent="-228600" algn="l" defTabSz="914400" rtl="0" eaLnBrk="1" latinLnBrk="0" hangingPunct="1">
-              <a:lnSpc>
-                <a:spcPct val="90000"/>
-              </a:lnSpc>
-              <a:spcBef>
-                <a:spcPts val="500"/>
-              </a:spcBef>
-              <a:buFont typeface="Arial" panose="020B0604020202020204" pitchFamily="34" charset="0"/>
-              <a:buChar char="•"/>
-              <a:defRPr sz="1800" kern="1200">
-                <a:solidFill>
-                  <a:schemeClr val="tx1"/>
-                </a:solidFill>
-                <a:latin typeface="+mn-lt"/>
-                <a:ea typeface="+mn-ea"/>
-                <a:cs typeface="+mn-cs"/>
-              </a:defRPr>
-            </a:lvl5pPr>
-            <a:lvl6pPr marL="2514600" indent="-228600" algn="l" defTabSz="914400" rtl="0" eaLnBrk="1" latinLnBrk="0" hangingPunct="1">
-              <a:lnSpc>
-                <a:spcPct val="90000"/>
-              </a:lnSpc>
-              <a:spcBef>
-                <a:spcPts val="500"/>
-              </a:spcBef>
-              <a:buFont typeface="Arial" panose="020B0604020202020204" pitchFamily="34" charset="0"/>
-              <a:buChar char="•"/>
-              <a:defRPr sz="1800" kern="1200">
-                <a:solidFill>
-                  <a:schemeClr val="tx1"/>
-                </a:solidFill>
-                <a:latin typeface="+mn-lt"/>
-                <a:ea typeface="+mn-ea"/>
-                <a:cs typeface="+mn-cs"/>
-              </a:defRPr>
-            </a:lvl6pPr>
-            <a:lvl7pPr marL="2971800" indent="-228600" algn="l" defTabSz="914400" rtl="0" eaLnBrk="1" latinLnBrk="0" hangingPunct="1">
-              <a:lnSpc>
-                <a:spcPct val="90000"/>
-              </a:lnSpc>
-              <a:spcBef>
-                <a:spcPts val="500"/>
-              </a:spcBef>
-              <a:buFont typeface="Arial" panose="020B0604020202020204" pitchFamily="34" charset="0"/>
-              <a:buChar char="•"/>
-              <a:defRPr sz="1800" kern="1200">
-                <a:solidFill>
-                  <a:schemeClr val="tx1"/>
-                </a:solidFill>
-                <a:latin typeface="+mn-lt"/>
-                <a:ea typeface="+mn-ea"/>
-                <a:cs typeface="+mn-cs"/>
-              </a:defRPr>
-            </a:lvl7pPr>
-            <a:lvl8pPr marL="3429000" indent="-228600" algn="l" defTabSz="914400" rtl="0" eaLnBrk="1" latinLnBrk="0" hangingPunct="1">
-              <a:lnSpc>
-                <a:spcPct val="90000"/>
-              </a:lnSpc>
-              <a:spcBef>
-                <a:spcPts val="500"/>
-              </a:spcBef>
-              <a:buFont typeface="Arial" panose="020B0604020202020204" pitchFamily="34" charset="0"/>
-              <a:buChar char="•"/>
-              <a:defRPr sz="1800" kern="1200">
-                <a:solidFill>
-                  <a:schemeClr val="tx1"/>
-                </a:solidFill>
-                <a:latin typeface="+mn-lt"/>
-                <a:ea typeface="+mn-ea"/>
-                <a:cs typeface="+mn-cs"/>
-              </a:defRPr>
-            </a:lvl8pPr>
-            <a:lvl9pPr marL="3886200" indent="-228600" algn="l" defTabSz="914400" rtl="0" eaLnBrk="1" latinLnBrk="0" hangingPunct="1">
-              <a:lnSpc>
-                <a:spcPct val="90000"/>
-              </a:lnSpc>
-              <a:spcBef>
-                <a:spcPts val="500"/>
-              </a:spcBef>
-              <a:buFont typeface="Arial" panose="020B0604020202020204" pitchFamily="34" charset="0"/>
-              <a:buChar char="•"/>
-              <a:defRPr sz="1800" kern="1200">
-                <a:solidFill>
-                  <a:schemeClr val="tx1"/>
-                </a:solidFill>
-                <a:latin typeface="+mn-lt"/>
-                <a:ea typeface="+mn-ea"/>
-                <a:cs typeface="+mn-cs"/>
-              </a:defRPr>
-            </a:lvl9pPr>
-          </a:lstStyle>
-          <a:p>
-            <a:pPr marL="0" indent="0" algn="just">
-              <a:buNone/>
-            </a:pPr>
-            <a:r>
-              <a:rPr lang="en-US" sz="2400" dirty="0"/>
-              <a:t>The models being compared include SVM, </a:t>
-            </a:r>
-            <a:r>
-              <a:rPr lang="en-US" sz="2400" dirty="0" err="1"/>
-              <a:t>LeNet</a:t>
-            </a:r>
-            <a:r>
-              <a:rPr lang="en-US" sz="2400" dirty="0"/>
-              <a:t> CNN, CRNN, and the Parallel Transformer Encoder with CNN Architecture. This section highlight the model with the highest accuracy among all the models compared.</a:t>
-            </a:r>
-          </a:p>
-        </p:txBody>
-      </p:sp>
       <p:cxnSp>
         <p:nvCxnSpPr>
           <p:cNvPr id="10" name="Google Shape;281;p9">
@@ -14777,7 +14628,7 @@
         </p:nvCxnSpPr>
         <p:spPr>
           <a:xfrm>
-            <a:off x="3388800" y="2798915"/>
+            <a:off x="3388800" y="3599313"/>
             <a:ext cx="5414400" cy="0"/>
           </a:xfrm>
           <a:prstGeom prst="straightConnector1">
@@ -15370,7 +15221,7 @@
           <p:nvPr/>
         </p:nvPicPr>
         <p:blipFill>
-          <a:blip r:embed="rId2">
+          <a:blip r:embed="rId3">
             <a:alphaModFix/>
           </a:blip>
           <a:stretch>
@@ -15474,10 +15325,9 @@
           <a:p>
             <a:pPr algn="ctr"/>
             <a:r>
-              <a:rPr lang="en-US" dirty="0" err="1"/>
-              <a:t>Kesulitan</a:t>
-            </a:r>
-            <a:endParaRPr lang="en-US" dirty="0"/>
+              <a:rPr lang="en-US" dirty="0"/>
+              <a:t>Conclusion</a:t>
+            </a:r>
           </a:p>
         </p:txBody>
       </p:sp>
@@ -15498,7 +15348,7 @@
         <p:spPr>
           <a:xfrm>
             <a:off x="2988600" y="2438868"/>
-            <a:ext cx="6214800" cy="2536963"/>
+            <a:ext cx="6214800" cy="3150420"/>
           </a:xfrm>
           <a:prstGeom prst="rect">
             <a:avLst/>
@@ -15677,339 +15527,24 @@
             </a:lvl9pPr>
           </a:lstStyle>
           <a:p>
-            <a:pPr marL="0" indent="0" algn="just">
-              <a:buNone/>
-            </a:pPr>
+            <a:pPr algn="just"/>
             <a:r>
               <a:rPr lang="en-US" sz="1800" dirty="0"/>
-              <a:t>The study addressed the problem of detecting human emotions from audio data by integrating the Transformer Encoder and CNN architectures to capture global dependencies and local patterns in audio features. Optimization techniques include fine-tuning hyperparameters and applying regularization methods, further enhanced accuracy. Comparative analysis on different models revealed that the Parallel Transformer Encoder with CNN Architecture achieved the highest accuracy, followed by the SVM model.</a:t>
-            </a:r>
-          </a:p>
-        </p:txBody>
-      </p:sp>
-      <p:cxnSp>
-        <p:nvCxnSpPr>
-          <p:cNvPr id="10" name="Google Shape;281;p9">
-            <a:extLst>
-              <a:ext uri="{FF2B5EF4-FFF2-40B4-BE49-F238E27FC236}">
-                <a16:creationId xmlns:a16="http://schemas.microsoft.com/office/drawing/2014/main" id="{8C501EF5-40A1-5ACA-3AA6-689FF195012D}"/>
-              </a:ext>
-            </a:extLst>
-          </p:cNvPr>
-          <p:cNvCxnSpPr/>
-          <p:nvPr/>
-        </p:nvCxnSpPr>
-        <p:spPr>
-          <a:xfrm>
-            <a:off x="3388800" y="2428845"/>
-            <a:ext cx="5414400" cy="0"/>
-          </a:xfrm>
-          <a:prstGeom prst="straightConnector1">
-            <a:avLst/>
-          </a:prstGeom>
-          <a:noFill/>
-          <a:ln w="9525" cap="flat" cmpd="sng">
-            <a:solidFill>
-              <a:srgbClr val="FF0000"/>
-            </a:solidFill>
-            <a:prstDash val="solid"/>
-            <a:round/>
-            <a:headEnd type="none" w="sm" len="sm"/>
-            <a:tailEnd type="none" w="sm" len="sm"/>
-          </a:ln>
-        </p:spPr>
-      </p:cxnSp>
-    </p:spTree>
-    <p:extLst>
-      <p:ext uri="{BB962C8B-B14F-4D97-AF65-F5344CB8AC3E}">
-        <p14:creationId xmlns:p14="http://schemas.microsoft.com/office/powerpoint/2010/main" val="2761440831"/>
-      </p:ext>
-    </p:extLst>
-  </p:cSld>
-  <p:clrMapOvr>
-    <a:masterClrMapping/>
-  </p:clrMapOvr>
-</p:sld>
-</file>
-
-<file path=ppt/slides/slide22.xml><?xml version="1.0" encoding="utf-8"?>
-<p:sld xmlns:a="http://schemas.openxmlformats.org/drawingml/2006/main" xmlns:r="http://schemas.openxmlformats.org/officeDocument/2006/relationships" xmlns:p="http://schemas.openxmlformats.org/presentationml/2006/main">
-  <p:cSld>
-    <p:spTree>
-      <p:nvGrpSpPr>
-        <p:cNvPr id="1" name=""/>
-        <p:cNvGrpSpPr/>
-        <p:nvPr/>
-      </p:nvGrpSpPr>
-      <p:grpSpPr>
-        <a:xfrm>
-          <a:off x="0" y="0"/>
-          <a:ext cx="0" cy="0"/>
-          <a:chOff x="0" y="0"/>
-          <a:chExt cx="0" cy="0"/>
-        </a:xfrm>
-      </p:grpSpPr>
-      <p:sp>
-        <p:nvSpPr>
-          <p:cNvPr id="8" name="Google Shape;276;p9">
-            <a:extLst>
-              <a:ext uri="{FF2B5EF4-FFF2-40B4-BE49-F238E27FC236}">
-                <a16:creationId xmlns:a16="http://schemas.microsoft.com/office/drawing/2014/main" id="{C0948A61-B9B7-C3C5-E8C7-6C57F58FAAC7}"/>
-              </a:ext>
-            </a:extLst>
-          </p:cNvPr>
-          <p:cNvSpPr txBox="1">
-            <a:spLocks/>
-          </p:cNvSpPr>
-          <p:nvPr/>
-        </p:nvSpPr>
-        <p:spPr>
-          <a:xfrm>
-            <a:off x="2988600" y="1545475"/>
-            <a:ext cx="6214800" cy="893200"/>
-          </a:xfrm>
-          <a:prstGeom prst="rect">
-            <a:avLst/>
-          </a:prstGeom>
-          <a:noFill/>
-          <a:ln>
-            <a:noFill/>
-          </a:ln>
-        </p:spPr>
-        <p:txBody>
-          <a:bodyPr spcFirstLastPara="1" vert="horz" wrap="square" lIns="121900" tIns="121900" rIns="121900" bIns="121900" rtlCol="0" anchor="ctr" anchorCtr="0">
-            <a:noAutofit/>
-          </a:bodyPr>
-          <a:lstStyle>
-            <a:lvl1pPr algn="l" defTabSz="914400" rtl="0" eaLnBrk="1" latinLnBrk="0" hangingPunct="1">
-              <a:lnSpc>
-                <a:spcPct val="90000"/>
-              </a:lnSpc>
-              <a:spcBef>
-                <a:spcPct val="0"/>
-              </a:spcBef>
-              <a:buNone/>
-              <a:defRPr sz="4400" kern="1200">
-                <a:solidFill>
-                  <a:schemeClr val="tx1"/>
-                </a:solidFill>
-                <a:latin typeface="+mj-lt"/>
-                <a:ea typeface="+mj-ea"/>
-                <a:cs typeface="+mj-cs"/>
-              </a:defRPr>
-            </a:lvl1pPr>
-          </a:lstStyle>
-          <a:p>
-            <a:pPr algn="ctr"/>
-            <a:r>
-              <a:rPr lang="en-US" dirty="0"/>
-              <a:t>Conclusion</a:t>
-            </a:r>
-          </a:p>
-        </p:txBody>
-      </p:sp>
-      <p:sp>
-        <p:nvSpPr>
-          <p:cNvPr id="9" name="Google Shape;277;p9">
-            <a:extLst>
-              <a:ext uri="{FF2B5EF4-FFF2-40B4-BE49-F238E27FC236}">
-                <a16:creationId xmlns:a16="http://schemas.microsoft.com/office/drawing/2014/main" id="{21F87AE8-D962-2CB0-1D30-AEB67B2E726B}"/>
-              </a:ext>
-            </a:extLst>
-          </p:cNvPr>
-          <p:cNvSpPr txBox="1">
-            <a:spLocks/>
-          </p:cNvSpPr>
-          <p:nvPr/>
-        </p:nvSpPr>
-        <p:spPr>
-          <a:xfrm>
-            <a:off x="2988600" y="2438868"/>
-            <a:ext cx="6214800" cy="2536963"/>
-          </a:xfrm>
-          <a:prstGeom prst="rect">
-            <a:avLst/>
-          </a:prstGeom>
-          <a:noFill/>
-          <a:ln>
-            <a:noFill/>
-          </a:ln>
-        </p:spPr>
-        <p:txBody>
-          <a:bodyPr spcFirstLastPara="1" vert="horz" wrap="square" lIns="121900" tIns="121900" rIns="121900" bIns="121900" rtlCol="0" anchor="ctr" anchorCtr="0">
-            <a:noAutofit/>
-          </a:bodyPr>
-          <a:lstStyle>
-            <a:lvl1pPr marL="228600" indent="-228600" algn="l" defTabSz="914400" rtl="0" eaLnBrk="1" latinLnBrk="0" hangingPunct="1">
-              <a:lnSpc>
-                <a:spcPct val="90000"/>
-              </a:lnSpc>
-              <a:spcBef>
-                <a:spcPts val="1000"/>
-              </a:spcBef>
-              <a:buFont typeface="Arial" panose="020B0604020202020204" pitchFamily="34" charset="0"/>
-              <a:buChar char="•"/>
-              <a:defRPr sz="2800" kern="1200">
-                <a:solidFill>
-                  <a:schemeClr val="tx1"/>
-                </a:solidFill>
-                <a:latin typeface="+mn-lt"/>
-                <a:ea typeface="+mn-ea"/>
-                <a:cs typeface="+mn-cs"/>
-              </a:defRPr>
-            </a:lvl1pPr>
-            <a:lvl2pPr marL="685800" indent="-228600" algn="l" defTabSz="914400" rtl="0" eaLnBrk="1" latinLnBrk="0" hangingPunct="1">
-              <a:lnSpc>
-                <a:spcPct val="90000"/>
-              </a:lnSpc>
-              <a:spcBef>
-                <a:spcPts val="500"/>
-              </a:spcBef>
-              <a:buFont typeface="Arial" panose="020B0604020202020204" pitchFamily="34" charset="0"/>
-              <a:buChar char="•"/>
-              <a:defRPr sz="2400" kern="1200">
-                <a:solidFill>
-                  <a:schemeClr val="tx1"/>
-                </a:solidFill>
-                <a:latin typeface="+mn-lt"/>
-                <a:ea typeface="+mn-ea"/>
-                <a:cs typeface="+mn-cs"/>
-              </a:defRPr>
-            </a:lvl2pPr>
-            <a:lvl3pPr marL="1143000" indent="-228600" algn="l" defTabSz="914400" rtl="0" eaLnBrk="1" latinLnBrk="0" hangingPunct="1">
-              <a:lnSpc>
-                <a:spcPct val="90000"/>
-              </a:lnSpc>
-              <a:spcBef>
-                <a:spcPts val="500"/>
-              </a:spcBef>
-              <a:buFont typeface="Arial" panose="020B0604020202020204" pitchFamily="34" charset="0"/>
-              <a:buChar char="•"/>
-              <a:defRPr sz="2000" kern="1200">
-                <a:solidFill>
-                  <a:schemeClr val="tx1"/>
-                </a:solidFill>
-                <a:latin typeface="+mn-lt"/>
-                <a:ea typeface="+mn-ea"/>
-                <a:cs typeface="+mn-cs"/>
-              </a:defRPr>
-            </a:lvl3pPr>
-            <a:lvl4pPr marL="1600200" indent="-228600" algn="l" defTabSz="914400" rtl="0" eaLnBrk="1" latinLnBrk="0" hangingPunct="1">
-              <a:lnSpc>
-                <a:spcPct val="90000"/>
-              </a:lnSpc>
-              <a:spcBef>
-                <a:spcPts val="500"/>
-              </a:spcBef>
-              <a:buFont typeface="Arial" panose="020B0604020202020204" pitchFamily="34" charset="0"/>
-              <a:buChar char="•"/>
-              <a:defRPr sz="1800" kern="1200">
-                <a:solidFill>
-                  <a:schemeClr val="tx1"/>
-                </a:solidFill>
-                <a:latin typeface="+mn-lt"/>
-                <a:ea typeface="+mn-ea"/>
-                <a:cs typeface="+mn-cs"/>
-              </a:defRPr>
-            </a:lvl4pPr>
-            <a:lvl5pPr marL="2057400" indent="-228600" algn="l" defTabSz="914400" rtl="0" eaLnBrk="1" latinLnBrk="0" hangingPunct="1">
-              <a:lnSpc>
-                <a:spcPct val="90000"/>
-              </a:lnSpc>
-              <a:spcBef>
-                <a:spcPts val="500"/>
-              </a:spcBef>
-              <a:buFont typeface="Arial" panose="020B0604020202020204" pitchFamily="34" charset="0"/>
-              <a:buChar char="•"/>
-              <a:defRPr sz="1800" kern="1200">
-                <a:solidFill>
-                  <a:schemeClr val="tx1"/>
-                </a:solidFill>
-                <a:latin typeface="+mn-lt"/>
-                <a:ea typeface="+mn-ea"/>
-                <a:cs typeface="+mn-cs"/>
-              </a:defRPr>
-            </a:lvl5pPr>
-            <a:lvl6pPr marL="2514600" indent="-228600" algn="l" defTabSz="914400" rtl="0" eaLnBrk="1" latinLnBrk="0" hangingPunct="1">
-              <a:lnSpc>
-                <a:spcPct val="90000"/>
-              </a:lnSpc>
-              <a:spcBef>
-                <a:spcPts val="500"/>
-              </a:spcBef>
-              <a:buFont typeface="Arial" panose="020B0604020202020204" pitchFamily="34" charset="0"/>
-              <a:buChar char="•"/>
-              <a:defRPr sz="1800" kern="1200">
-                <a:solidFill>
-                  <a:schemeClr val="tx1"/>
-                </a:solidFill>
-                <a:latin typeface="+mn-lt"/>
-                <a:ea typeface="+mn-ea"/>
-                <a:cs typeface="+mn-cs"/>
-              </a:defRPr>
-            </a:lvl6pPr>
-            <a:lvl7pPr marL="2971800" indent="-228600" algn="l" defTabSz="914400" rtl="0" eaLnBrk="1" latinLnBrk="0" hangingPunct="1">
-              <a:lnSpc>
-                <a:spcPct val="90000"/>
-              </a:lnSpc>
-              <a:spcBef>
-                <a:spcPts val="500"/>
-              </a:spcBef>
-              <a:buFont typeface="Arial" panose="020B0604020202020204" pitchFamily="34" charset="0"/>
-              <a:buChar char="•"/>
-              <a:defRPr sz="1800" kern="1200">
-                <a:solidFill>
-                  <a:schemeClr val="tx1"/>
-                </a:solidFill>
-                <a:latin typeface="+mn-lt"/>
-                <a:ea typeface="+mn-ea"/>
-                <a:cs typeface="+mn-cs"/>
-              </a:defRPr>
-            </a:lvl7pPr>
-            <a:lvl8pPr marL="3429000" indent="-228600" algn="l" defTabSz="914400" rtl="0" eaLnBrk="1" latinLnBrk="0" hangingPunct="1">
-              <a:lnSpc>
-                <a:spcPct val="90000"/>
-              </a:lnSpc>
-              <a:spcBef>
-                <a:spcPts val="500"/>
-              </a:spcBef>
-              <a:buFont typeface="Arial" panose="020B0604020202020204" pitchFamily="34" charset="0"/>
-              <a:buChar char="•"/>
-              <a:defRPr sz="1800" kern="1200">
-                <a:solidFill>
-                  <a:schemeClr val="tx1"/>
-                </a:solidFill>
-                <a:latin typeface="+mn-lt"/>
-                <a:ea typeface="+mn-ea"/>
-                <a:cs typeface="+mn-cs"/>
-              </a:defRPr>
-            </a:lvl8pPr>
-            <a:lvl9pPr marL="3886200" indent="-228600" algn="l" defTabSz="914400" rtl="0" eaLnBrk="1" latinLnBrk="0" hangingPunct="1">
-              <a:lnSpc>
-                <a:spcPct val="90000"/>
-              </a:lnSpc>
-              <a:spcBef>
-                <a:spcPts val="500"/>
-              </a:spcBef>
-              <a:buFont typeface="Arial" panose="020B0604020202020204" pitchFamily="34" charset="0"/>
-              <a:buChar char="•"/>
-              <a:defRPr sz="1800" kern="1200">
-                <a:solidFill>
-                  <a:schemeClr val="tx1"/>
-                </a:solidFill>
-                <a:latin typeface="+mn-lt"/>
-                <a:ea typeface="+mn-ea"/>
-                <a:cs typeface="+mn-cs"/>
-              </a:defRPr>
-            </a:lvl9pPr>
-          </a:lstStyle>
-          <a:p>
-            <a:pPr marL="0" indent="0" algn="just">
-              <a:buNone/>
-            </a:pPr>
+              <a:t>The study addressed the problem of detecting human emotions from audio data by integrating the Transformer Encoder and CNN architectures to capture global dependencies and local patterns in audio features. </a:t>
+            </a:r>
+          </a:p>
+          <a:p>
+            <a:pPr algn="just"/>
             <a:r>
               <a:rPr lang="en-US" sz="1800" dirty="0"/>
-              <a:t>The study addressed the problem of detecting human emotions from audio data by integrating the Transformer Encoder and CNN architectures to capture global dependencies and local patterns in audio features. Optimization techniques include fine-tuning hyperparameters and applying regularization methods, further enhanced accuracy. Comparative analysis on different models revealed that the Parallel Transformer Encoder with CNN Architecture achieved the highest accuracy, followed by the SVM model.</a:t>
+              <a:t>Optimization techniques include fine-tuning hyperparameters and applying regularization methods, further enhanced accuracy. </a:t>
+            </a:r>
+          </a:p>
+          <a:p>
+            <a:pPr algn="just"/>
+            <a:r>
+              <a:rPr lang="en-US" sz="1800" dirty="0"/>
+              <a:t>Comparative analysis on different models revealed that the Parallel Transformer Encoder with CNN Architecture achieved the highest accuracy, followed by the SVM model.</a:t>
             </a:r>
           </a:p>
         </p:txBody>
@@ -16059,7 +15594,7 @@
 </p:sld>
 </file>
 
-<file path=ppt/slides/slide23.xml><?xml version="1.0" encoding="utf-8"?>
+<file path=ppt/slides/slide22.xml><?xml version="1.0" encoding="utf-8"?>
 <p:sld xmlns:a="http://schemas.openxmlformats.org/drawingml/2006/main" xmlns:r="http://schemas.openxmlformats.org/officeDocument/2006/relationships" xmlns:p="http://schemas.openxmlformats.org/presentationml/2006/main">
   <p:cSld>
     <p:spTree>
@@ -16122,7 +15657,7 @@
             </a:pPr>
             <a:r>
               <a:rPr lang="en-US" sz="7200" dirty="0"/>
-              <a:t>TERIMA KASIH</a:t>
+              <a:t>Thank You</a:t>
             </a:r>
           </a:p>
         </p:txBody>
@@ -18107,7 +17642,7 @@
                 <a:latin typeface="+mn-lt"/>
                 <a:sym typeface="DM Sans"/>
               </a:rPr>
-              <a:t>Transforming raw audio signals into a format that is suitable for machine learning algorithms to extract meaningful information</a:t>
+              <a:t>Transforming raw audio signals into a format that is suitable for machine learning algorithms to extract meaningful information.</a:t>
             </a:r>
           </a:p>
         </p:txBody>
@@ -21114,7 +20649,7 @@
                 <a:latin typeface="+mn-lt"/>
                 <a:sym typeface="DM Sans"/>
               </a:rPr>
-              <a:t>Contain diverse collection of acted emotional expressions, including speech and facial expressions, from professional actors</a:t>
+              <a:t>Contain diverse collection of acted emotional expressions, including speech and facial expressions, from professional actors.</a:t>
             </a:r>
           </a:p>
         </p:txBody>
@@ -24563,6 +24098,12 @@
 </file>
 
 <file path=customXml/item1.xml><?xml version="1.0" encoding="utf-8"?>
+<p:properties xmlns:p="http://schemas.microsoft.com/office/2006/metadata/properties" xmlns:xsi="http://www.w3.org/2001/XMLSchema-instance" xmlns:pc="http://schemas.microsoft.com/office/infopath/2007/PartnerControls">
+  <documentManagement/>
+</p:properties>
+</file>
+
+<file path=customXml/item2.xml><?xml version="1.0" encoding="utf-8"?>
 <ct:contentTypeSchema xmlns:ct="http://schemas.microsoft.com/office/2006/metadata/contentType" xmlns:ma="http://schemas.microsoft.com/office/2006/metadata/properties/metaAttributes" ct:_="" ma:_="" ma:contentTypeName="Dokumen" ma:contentTypeID="0x010100E578BFB713B0A04AA9CB3FB0E09BB096" ma:contentTypeVersion="8" ma:contentTypeDescription="Buat sebuah dokumen baru." ma:contentTypeScope="" ma:versionID="b12db5772b421c3d97e5e8cc52461df1">
   <xsd:schema xmlns:xsd="http://www.w3.org/2001/XMLSchema" xmlns:xs="http://www.w3.org/2001/XMLSchema" xmlns:p="http://schemas.microsoft.com/office/2006/metadata/properties" xmlns:ns3="d27b1e0a-a80f-43b3-a72c-03febd3edde5" targetNamespace="http://schemas.microsoft.com/office/2006/metadata/properties" ma:root="true" ma:fieldsID="93b8b61b0ccf34e75e41c3c949ba1e0b" ns3:_="">
     <xsd:import namespace="d27b1e0a-a80f-43b3-a72c-03febd3edde5"/>
@@ -24732,12 +24273,6 @@
 </ct:contentTypeSchema>
 </file>
 
-<file path=customXml/item2.xml><?xml version="1.0" encoding="utf-8"?>
-<p:properties xmlns:p="http://schemas.microsoft.com/office/2006/metadata/properties" xmlns:xsi="http://www.w3.org/2001/XMLSchema-instance" xmlns:pc="http://schemas.microsoft.com/office/infopath/2007/PartnerControls">
-  <documentManagement/>
-</p:properties>
-</file>
-
 <file path=customXml/item3.xml><?xml version="1.0" encoding="utf-8"?>
 <?mso-contentType ?>
 <FormTemplates xmlns="http://schemas.microsoft.com/sharepoint/v3/contenttype/forms">
@@ -24748,6 +24283,22 @@
 </file>
 
 <file path=customXml/itemProps1.xml><?xml version="1.0" encoding="utf-8"?>
+<ds:datastoreItem xmlns:ds="http://schemas.openxmlformats.org/officeDocument/2006/customXml" ds:itemID="{CD9CB790-CC05-41EE-8468-36831EC64B78}">
+  <ds:schemaRefs>
+    <ds:schemaRef ds:uri="http://schemas.openxmlformats.org/package/2006/metadata/core-properties"/>
+    <ds:schemaRef ds:uri="http://schemas.microsoft.com/office/2006/documentManagement/types"/>
+    <ds:schemaRef ds:uri="http://schemas.microsoft.com/office/infopath/2007/PartnerControls"/>
+    <ds:schemaRef ds:uri="d27b1e0a-a80f-43b3-a72c-03febd3edde5"/>
+    <ds:schemaRef ds:uri="http://schemas.microsoft.com/office/2006/metadata/properties"/>
+    <ds:schemaRef ds:uri="http://www.w3.org/XML/1998/namespace"/>
+    <ds:schemaRef ds:uri="http://purl.org/dc/dcmitype/"/>
+    <ds:schemaRef ds:uri="http://purl.org/dc/terms/"/>
+    <ds:schemaRef ds:uri="http://purl.org/dc/elements/1.1/"/>
+  </ds:schemaRefs>
+</ds:datastoreItem>
+</file>
+
+<file path=customXml/itemProps2.xml><?xml version="1.0" encoding="utf-8"?>
 <ds:datastoreItem xmlns:ds="http://schemas.openxmlformats.org/officeDocument/2006/customXml" ds:itemID="{74C6180C-AB73-4F26-8914-63FC793B0B03}">
   <ds:schemaRefs>
     <ds:schemaRef ds:uri="http://schemas.microsoft.com/office/2006/metadata/contentType"/>
@@ -24766,22 +24317,6 @@
 </ds:datastoreItem>
 </file>
 
-<file path=customXml/itemProps2.xml><?xml version="1.0" encoding="utf-8"?>
-<ds:datastoreItem xmlns:ds="http://schemas.openxmlformats.org/officeDocument/2006/customXml" ds:itemID="{CD9CB790-CC05-41EE-8468-36831EC64B78}">
-  <ds:schemaRefs>
-    <ds:schemaRef ds:uri="http://schemas.openxmlformats.org/package/2006/metadata/core-properties"/>
-    <ds:schemaRef ds:uri="http://schemas.microsoft.com/office/2006/documentManagement/types"/>
-    <ds:schemaRef ds:uri="http://schemas.microsoft.com/office/infopath/2007/PartnerControls"/>
-    <ds:schemaRef ds:uri="d27b1e0a-a80f-43b3-a72c-03febd3edde5"/>
-    <ds:schemaRef ds:uri="http://schemas.microsoft.com/office/2006/metadata/properties"/>
-    <ds:schemaRef ds:uri="http://www.w3.org/XML/1998/namespace"/>
-    <ds:schemaRef ds:uri="http://purl.org/dc/dcmitype/"/>
-    <ds:schemaRef ds:uri="http://purl.org/dc/terms/"/>
-    <ds:schemaRef ds:uri="http://purl.org/dc/elements/1.1/"/>
-  </ds:schemaRefs>
-</ds:datastoreItem>
-</file>
-
 <file path=customXml/itemProps3.xml><?xml version="1.0" encoding="utf-8"?>
 <ds:datastoreItem xmlns:ds="http://schemas.openxmlformats.org/officeDocument/2006/customXml" ds:itemID="{6F28412E-6216-429D-9368-A2DF44D347EE}">
   <ds:schemaRefs>

</xml_diff>